<commit_message>
testing changes to ppt
</commit_message>
<xml_diff>
--- a/PowerPointTest.pptx
+++ b/PowerPointTest.pptx
@@ -113,7 +113,7 @@
   </p:defaultTextStyle>
   <p:extLst>
     <p:ext uri="{EFAFB233-063F-42B5-8137-9DF3F51BA10A}">
-      <p15:sldGuideLst xmlns:p15="http://schemas.microsoft.com/office/powerpoint/2012/main" xmlns="">
+      <p15:sldGuideLst xmlns:p15="http://schemas.microsoft.com/office/powerpoint/2012/main">
         <p15:guide id="1" orient="horz" pos="3120">
           <p15:clr>
             <a:srgbClr val="A4A3A4"/>
@@ -3938,7 +3938,7 @@
           <p:nvPr>
             <p:extLst>
               <p:ext uri="{D42A27DB-BD31-4B8C-83A1-F6EECF244321}">
-                <p14:modId xmlns:p14="http://schemas.microsoft.com/office/powerpoint/2010/main" val="1118561288"/>
+                <p14:modId xmlns:p14="http://schemas.microsoft.com/office/powerpoint/2010/main" val="3561379017"/>
               </p:ext>
             </p:extLst>
           </p:nvPr>
@@ -3979,7 +3979,7 @@
                     <a:p>
                       <a:r>
                         <a:rPr lang="en-IE" sz="1200" dirty="0" smtClean="0"/>
-                        <a:t>Name</a:t>
+                        <a:t>Tara Keena</a:t>
                       </a:r>
                       <a:endParaRPr lang="en-IE" sz="1200" dirty="0"/>
                     </a:p>
@@ -4085,7 +4085,7 @@
                     <a:p>
                       <a:r>
                         <a:rPr lang="en-IE" sz="1200" dirty="0" smtClean="0"/>
-                        <a:t>1.0</a:t>
+                        <a:t>1.1</a:t>
                       </a:r>
                       <a:endParaRPr lang="en-IE" sz="1200" dirty="0"/>
                     </a:p>

</xml_diff>

<commit_message>
Edited ppt and testing if can push to github
</commit_message>
<xml_diff>
--- a/PowerPointTest.pptx
+++ b/PowerPointTest.pptx
@@ -113,7 +113,7 @@
   </p:defaultTextStyle>
   <p:extLst>
     <p:ext uri="{EFAFB233-063F-42B5-8137-9DF3F51BA10A}">
-      <p15:sldGuideLst xmlns:p15="http://schemas.microsoft.com/office/powerpoint/2012/main">
+      <p15:sldGuideLst xmlns:p15="http://schemas.microsoft.com/office/powerpoint/2012/main" xmlns="">
         <p15:guide id="1" orient="horz" pos="3120">
           <p15:clr>
             <a:srgbClr val="A4A3A4"/>
@@ -3924,8 +3924,29 @@
                 <a:ea typeface="Times"/>
                 <a:cs typeface="Times New Roman" pitchFamily="18" charset="0"/>
               </a:rPr>
-              <a:t>Test Report</a:t>
-            </a:r>
+              <a:t>Editing this line on </a:t>
+            </a:r>
+            <a:r>
+              <a:rPr lang="en-US" sz="1400" dirty="0" err="1" smtClean="0">
+                <a:latin typeface="Helvetica LT Std Light" pitchFamily="34" charset="0"/>
+                <a:ea typeface="Times"/>
+                <a:cs typeface="Times New Roman" pitchFamily="18" charset="0"/>
+              </a:rPr>
+              <a:t>tarakeena</a:t>
+            </a:r>
+            <a:r>
+              <a:rPr lang="en-US" sz="1400" dirty="0" smtClean="0">
+                <a:latin typeface="Helvetica LT Std Light" pitchFamily="34" charset="0"/>
+                <a:ea typeface="Times"/>
+                <a:cs typeface="Times New Roman" pitchFamily="18" charset="0"/>
+              </a:rPr>
+              <a:t> account</a:t>
+            </a:r>
+            <a:endParaRPr lang="en-US" sz="1400" dirty="0" smtClean="0">
+              <a:latin typeface="Helvetica LT Std Light" pitchFamily="34" charset="0"/>
+              <a:ea typeface="Times"/>
+              <a:cs typeface="Times New Roman" pitchFamily="18" charset="0"/>
+            </a:endParaRPr>
           </a:p>
         </p:txBody>
       </p:sp>
@@ -3938,7 +3959,7 @@
           <p:nvPr>
             <p:extLst>
               <p:ext uri="{D42A27DB-BD31-4B8C-83A1-F6EECF244321}">
-                <p14:modId xmlns:p14="http://schemas.microsoft.com/office/powerpoint/2010/main" val="3561379017"/>
+                <p14:modId xmlns:p14="http://schemas.microsoft.com/office/powerpoint/2010/main" val="640847601"/>
               </p:ext>
             </p:extLst>
           </p:nvPr>
@@ -4085,7 +4106,7 @@
                     <a:p>
                       <a:r>
                         <a:rPr lang="en-IE" sz="1200" dirty="0" smtClean="0"/>
-                        <a:t>1.1</a:t>
+                        <a:t>1.2</a:t>
                       </a:r>
                       <a:endParaRPr lang="en-IE" sz="1200" dirty="0"/>
                     </a:p>

</xml_diff>

<commit_message>
editing ppt same time as other account to test
</commit_message>
<xml_diff>
--- a/PowerPointTest.pptx
+++ b/PowerPointTest.pptx
@@ -113,7 +113,7 @@
   </p:defaultTextStyle>
   <p:extLst>
     <p:ext uri="{EFAFB233-063F-42B5-8137-9DF3F51BA10A}">
-      <p15:sldGuideLst xmlns:p15="http://schemas.microsoft.com/office/powerpoint/2012/main" xmlns="">
+      <p15:sldGuideLst xmlns="" xmlns:p15="http://schemas.microsoft.com/office/powerpoint/2012/main">
         <p15:guide id="1" orient="horz" pos="3120">
           <p15:clr>
             <a:srgbClr val="A4A3A4"/>
@@ -3868,7 +3868,7 @@
         <p:spPr>
           <a:xfrm>
             <a:off x="607676" y="2144687"/>
-            <a:ext cx="5715040" cy="615553"/>
+            <a:ext cx="5715040" cy="830997"/>
           </a:xfrm>
           <a:prstGeom prst="rect">
             <a:avLst/>
@@ -3940,7 +3940,38 @@
                 <a:ea typeface="Times"/>
                 <a:cs typeface="Times New Roman" pitchFamily="18" charset="0"/>
               </a:rPr>
-              <a:t> account</a:t>
+              <a:t> </a:t>
+            </a:r>
+            <a:r>
+              <a:rPr lang="en-US" sz="1400" dirty="0" smtClean="0">
+                <a:latin typeface="Helvetica LT Std Light" pitchFamily="34" charset="0"/>
+                <a:ea typeface="Times"/>
+                <a:cs typeface="Times New Roman" pitchFamily="18" charset="0"/>
+              </a:rPr>
+              <a:t>account</a:t>
+            </a:r>
+          </a:p>
+          <a:p>
+            <a:pPr lvl="0" algn="ctr" eaLnBrk="0" fontAlgn="base" hangingPunct="0">
+              <a:spcBef>
+                <a:spcPct val="0"/>
+              </a:spcBef>
+              <a:spcAft>
+                <a:spcPct val="0"/>
+              </a:spcAft>
+              <a:tabLst>
+                <a:tab pos="114300" algn="l"/>
+                <a:tab pos="228600" algn="l"/>
+                <a:tab pos="457200" algn="l"/>
+              </a:tabLst>
+            </a:pPr>
+            <a:r>
+              <a:rPr lang="en-US" sz="1400" dirty="0" smtClean="0">
+                <a:latin typeface="Helvetica LT Std Light" pitchFamily="34" charset="0"/>
+                <a:ea typeface="Times"/>
+                <a:cs typeface="Times New Roman" pitchFamily="18" charset="0"/>
+              </a:rPr>
+              <a:t>Success – now editing this line at the same time as other account </a:t>
             </a:r>
             <a:endParaRPr lang="en-US" sz="1400" dirty="0" smtClean="0">
               <a:latin typeface="Helvetica LT Std Light" pitchFamily="34" charset="0"/>

</xml_diff>

<commit_message>
edting ppt same time as other account. Other changes pushed to github - now attempting to push this version
</commit_message>
<xml_diff>
--- a/PowerPointTest.pptx
+++ b/PowerPointTest.pptx
@@ -5,14 +5,15 @@
     <p:sldMasterId id="2147483648" r:id="rId1"/>
   </p:sldMasterIdLst>
   <p:notesMasterIdLst>
-    <p:notesMasterId r:id="rId7"/>
+    <p:notesMasterId r:id="rId8"/>
   </p:notesMasterIdLst>
   <p:sldIdLst>
     <p:sldId id="256" r:id="rId2"/>
     <p:sldId id="294" r:id="rId3"/>
     <p:sldId id="298" r:id="rId4"/>
     <p:sldId id="310" r:id="rId5"/>
-    <p:sldId id="309" r:id="rId6"/>
+    <p:sldId id="311" r:id="rId6"/>
+    <p:sldId id="309" r:id="rId7"/>
   </p:sldIdLst>
   <p:sldSz cx="6858000" cy="9906000" type="A4"/>
   <p:notesSz cx="6858000" cy="9144000"/>
@@ -113,7 +114,7 @@
   </p:defaultTextStyle>
   <p:extLst>
     <p:ext uri="{EFAFB233-063F-42B5-8137-9DF3F51BA10A}">
-      <p15:sldGuideLst xmlns:p15="http://schemas.microsoft.com/office/powerpoint/2012/main" xmlns="">
+      <p15:sldGuideLst xmlns:p15="http://schemas.microsoft.com/office/powerpoint/2012/main">
         <p15:guide id="1" orient="horz" pos="3120">
           <p15:clr>
             <a:srgbClr val="A4A3A4"/>
@@ -3942,11 +3943,6 @@
               </a:rPr>
               <a:t> account</a:t>
             </a:r>
-            <a:endParaRPr lang="en-US" sz="1400" dirty="0" smtClean="0">
-              <a:latin typeface="Helvetica LT Std Light" pitchFamily="34" charset="0"/>
-              <a:ea typeface="Times"/>
-              <a:cs typeface="Times New Roman" pitchFamily="18" charset="0"/>
-            </a:endParaRPr>
           </a:p>
         </p:txBody>
       </p:sp>
@@ -7464,22 +7460,10 @@
           <a:lstStyle/>
           <a:p>
             <a:r>
-              <a:rPr lang="ga-IE" smtClean="0">
-                <a:solidFill>
-                  <a:prstClr val="black">
-                    <a:tint val="75000"/>
-                  </a:prstClr>
-                </a:solidFill>
-              </a:rPr>
+              <a:rPr lang="ga-IE" smtClean="0"/>
               <a:t>IrishApps</a:t>
             </a:r>
-            <a:endParaRPr lang="ga-IE">
-              <a:solidFill>
-                <a:prstClr val="black">
-                  <a:tint val="75000"/>
-                </a:prstClr>
-              </a:solidFill>
-            </a:endParaRPr>
+            <a:endParaRPr lang="ga-IE" dirty="0"/>
           </a:p>
         </p:txBody>
       </p:sp>
@@ -7499,6 +7483,2533 @@
           <a:lstStyle/>
           <a:p>
             <a:fld id="{9F181B0E-BCC9-4F7B-9A07-FD9E8F929D4E}" type="slidenum">
+              <a:rPr lang="ga-IE" smtClean="0"/>
+              <a:pPr/>
+              <a:t>5</a:t>
+            </a:fld>
+            <a:endParaRPr lang="ga-IE"/>
+          </a:p>
+        </p:txBody>
+      </p:sp>
+      <p:sp>
+        <p:nvSpPr>
+          <p:cNvPr id="13" name="TextBox 12"/>
+          <p:cNvSpPr txBox="1"/>
+          <p:nvPr/>
+        </p:nvSpPr>
+        <p:spPr>
+          <a:xfrm>
+            <a:off x="0" y="504389"/>
+            <a:ext cx="6858000" cy="523220"/>
+          </a:xfrm>
+          <a:prstGeom prst="rect">
+            <a:avLst/>
+          </a:prstGeom>
+          <a:noFill/>
+        </p:spPr>
+        <p:txBody>
+          <a:bodyPr wrap="square" rtlCol="0">
+            <a:spAutoFit/>
+          </a:bodyPr>
+          <a:lstStyle/>
+          <a:p>
+            <a:pPr defTabSz="268288"/>
+            <a:r>
+              <a:rPr lang="ga-IE" sz="1600" b="1" dirty="0" smtClean="0"/>
+              <a:t>3. </a:t>
+            </a:r>
+            <a:r>
+              <a:rPr lang="en-IE" sz="1600" b="1" dirty="0" smtClean="0"/>
+              <a:t>Bugs</a:t>
+            </a:r>
+            <a:r>
+              <a:rPr lang="ga-IE" sz="1600" b="1" dirty="0" smtClean="0"/>
+              <a:t>:</a:t>
+            </a:r>
+            <a:r>
+              <a:rPr lang="en-IE" sz="1600" b="1" dirty="0" smtClean="0"/>
+              <a:t> </a:t>
+            </a:r>
+            <a:r>
+              <a:rPr lang="en-IE" sz="1100" dirty="0" smtClean="0"/>
+              <a:t>Bugs 1-4</a:t>
+            </a:r>
+            <a:endParaRPr lang="ga-IE" sz="1100" dirty="0" smtClean="0"/>
+          </a:p>
+          <a:p>
+            <a:pPr marL="457200" indent="-457200" defTabSz="268288">
+              <a:buAutoNum type="arabicPeriod"/>
+            </a:pPr>
+            <a:endParaRPr lang="ga-IE" sz="1200" dirty="0"/>
+          </a:p>
+        </p:txBody>
+      </p:sp>
+      <p:graphicFrame>
+        <p:nvGraphicFramePr>
+          <p:cNvPr id="5" name="Table 4"/>
+          <p:cNvGraphicFramePr>
+            <a:graphicFrameLocks noGrp="1"/>
+          </p:cNvGraphicFramePr>
+          <p:nvPr>
+            <p:extLst/>
+          </p:nvPr>
+        </p:nvGraphicFramePr>
+        <p:xfrm>
+          <a:off x="291831" y="1047064"/>
+          <a:ext cx="6223269" cy="1783387"/>
+        </p:xfrm>
+        <a:graphic>
+          <a:graphicData uri="http://schemas.openxmlformats.org/drawingml/2006/table">
+            <a:tbl>
+              <a:tblPr firstRow="1" firstCol="1" bandRow="1">
+                <a:tableStyleId>{5940675A-B579-460E-94D1-54222C63F5DA}</a:tableStyleId>
+              </a:tblPr>
+              <a:tblGrid>
+                <a:gridCol w="795297"/>
+                <a:gridCol w="851167"/>
+                <a:gridCol w="880813"/>
+                <a:gridCol w="863889"/>
+                <a:gridCol w="869801"/>
+                <a:gridCol w="1052984"/>
+                <a:gridCol w="909318"/>
+              </a:tblGrid>
+              <a:tr h="234345">
+                <a:tc>
+                  <a:txBody>
+                    <a:bodyPr/>
+                    <a:lstStyle/>
+                    <a:p>
+                      <a:pPr>
+                        <a:lnSpc>
+                          <a:spcPct val="107000"/>
+                        </a:lnSpc>
+                        <a:spcAft>
+                          <a:spcPts val="800"/>
+                        </a:spcAft>
+                      </a:pPr>
+                      <a:r>
+                        <a:rPr lang="en-IE" sz="800" b="1" dirty="0">
+                          <a:effectLst/>
+                        </a:rPr>
+                        <a:t>Screen Name:</a:t>
+                      </a:r>
+                      <a:endParaRPr lang="en-IE" sz="800" b="1" dirty="0">
+                        <a:effectLst/>
+                        <a:latin typeface="Calibri" panose="020F0502020204030204" pitchFamily="34" charset="0"/>
+                        <a:ea typeface="Calibri" panose="020F0502020204030204" pitchFamily="34" charset="0"/>
+                        <a:cs typeface="Times New Roman" panose="02020603050405020304" pitchFamily="18" charset="0"/>
+                      </a:endParaRPr>
+                    </a:p>
+                  </a:txBody>
+                  <a:tcPr marL="61066" marR="61066" marT="0" marB="0"/>
+                </a:tc>
+                <a:tc>
+                  <a:txBody>
+                    <a:bodyPr/>
+                    <a:lstStyle/>
+                    <a:p>
+                      <a:pPr>
+                        <a:lnSpc>
+                          <a:spcPct val="107000"/>
+                        </a:lnSpc>
+                        <a:spcAft>
+                          <a:spcPts val="800"/>
+                        </a:spcAft>
+                      </a:pPr>
+                      <a:r>
+                        <a:rPr lang="en-IE" sz="800" b="1" dirty="0">
+                          <a:effectLst/>
+                        </a:rPr>
+                        <a:t>Summary:</a:t>
+                      </a:r>
+                      <a:endParaRPr lang="en-IE" sz="800" b="1" dirty="0">
+                        <a:effectLst/>
+                        <a:latin typeface="Calibri" panose="020F0502020204030204" pitchFamily="34" charset="0"/>
+                        <a:ea typeface="Calibri" panose="020F0502020204030204" pitchFamily="34" charset="0"/>
+                        <a:cs typeface="Times New Roman" panose="02020603050405020304" pitchFamily="18" charset="0"/>
+                      </a:endParaRPr>
+                    </a:p>
+                  </a:txBody>
+                  <a:tcPr marL="61066" marR="61066" marT="0" marB="0"/>
+                </a:tc>
+                <a:tc>
+                  <a:txBody>
+                    <a:bodyPr/>
+                    <a:lstStyle/>
+                    <a:p>
+                      <a:pPr>
+                        <a:lnSpc>
+                          <a:spcPct val="107000"/>
+                        </a:lnSpc>
+                        <a:spcAft>
+                          <a:spcPts val="800"/>
+                        </a:spcAft>
+                      </a:pPr>
+                      <a:r>
+                        <a:rPr lang="en-IE" sz="800" b="1" dirty="0">
+                          <a:effectLst/>
+                        </a:rPr>
+                        <a:t>Description:</a:t>
+                      </a:r>
+                      <a:endParaRPr lang="en-IE" sz="800" b="1" dirty="0">
+                        <a:effectLst/>
+                        <a:latin typeface="Calibri" panose="020F0502020204030204" pitchFamily="34" charset="0"/>
+                        <a:ea typeface="Calibri" panose="020F0502020204030204" pitchFamily="34" charset="0"/>
+                        <a:cs typeface="Times New Roman" panose="02020603050405020304" pitchFamily="18" charset="0"/>
+                      </a:endParaRPr>
+                    </a:p>
+                  </a:txBody>
+                  <a:tcPr marL="61066" marR="61066" marT="0" marB="0"/>
+                </a:tc>
+                <a:tc>
+                  <a:txBody>
+                    <a:bodyPr/>
+                    <a:lstStyle/>
+                    <a:p>
+                      <a:pPr>
+                        <a:lnSpc>
+                          <a:spcPct val="107000"/>
+                        </a:lnSpc>
+                        <a:spcAft>
+                          <a:spcPts val="800"/>
+                        </a:spcAft>
+                      </a:pPr>
+                      <a:r>
+                        <a:rPr lang="en-IE" sz="800" b="1" dirty="0">
+                          <a:effectLst/>
+                        </a:rPr>
+                        <a:t>Actual Results:</a:t>
+                      </a:r>
+                      <a:endParaRPr lang="en-IE" sz="800" b="1" dirty="0">
+                        <a:effectLst/>
+                        <a:latin typeface="Calibri" panose="020F0502020204030204" pitchFamily="34" charset="0"/>
+                        <a:ea typeface="Calibri" panose="020F0502020204030204" pitchFamily="34" charset="0"/>
+                        <a:cs typeface="Times New Roman" panose="02020603050405020304" pitchFamily="18" charset="0"/>
+                      </a:endParaRPr>
+                    </a:p>
+                  </a:txBody>
+                  <a:tcPr marL="61066" marR="61066" marT="0" marB="0"/>
+                </a:tc>
+                <a:tc>
+                  <a:txBody>
+                    <a:bodyPr/>
+                    <a:lstStyle/>
+                    <a:p>
+                      <a:pPr>
+                        <a:lnSpc>
+                          <a:spcPct val="107000"/>
+                        </a:lnSpc>
+                        <a:spcAft>
+                          <a:spcPts val="800"/>
+                        </a:spcAft>
+                      </a:pPr>
+                      <a:r>
+                        <a:rPr lang="en-IE" sz="800" b="1" dirty="0">
+                          <a:effectLst/>
+                        </a:rPr>
+                        <a:t>Expected Results:</a:t>
+                      </a:r>
+                      <a:endParaRPr lang="en-IE" sz="800" b="1" dirty="0">
+                        <a:effectLst/>
+                        <a:latin typeface="Calibri" panose="020F0502020204030204" pitchFamily="34" charset="0"/>
+                        <a:ea typeface="Calibri" panose="020F0502020204030204" pitchFamily="34" charset="0"/>
+                        <a:cs typeface="Times New Roman" panose="02020603050405020304" pitchFamily="18" charset="0"/>
+                      </a:endParaRPr>
+                    </a:p>
+                  </a:txBody>
+                  <a:tcPr marL="61066" marR="61066" marT="0" marB="0"/>
+                </a:tc>
+                <a:tc>
+                  <a:txBody>
+                    <a:bodyPr/>
+                    <a:lstStyle/>
+                    <a:p>
+                      <a:pPr>
+                        <a:lnSpc>
+                          <a:spcPct val="107000"/>
+                        </a:lnSpc>
+                        <a:spcAft>
+                          <a:spcPts val="800"/>
+                        </a:spcAft>
+                      </a:pPr>
+                      <a:r>
+                        <a:rPr lang="en-IE" sz="800" b="1" dirty="0">
+                          <a:effectLst/>
+                        </a:rPr>
+                        <a:t>Other Information:</a:t>
+                      </a:r>
+                      <a:endParaRPr lang="en-IE" sz="800" b="1" dirty="0">
+                        <a:effectLst/>
+                        <a:latin typeface="Calibri" panose="020F0502020204030204" pitchFamily="34" charset="0"/>
+                        <a:ea typeface="Calibri" panose="020F0502020204030204" pitchFamily="34" charset="0"/>
+                        <a:cs typeface="Times New Roman" panose="02020603050405020304" pitchFamily="18" charset="0"/>
+                      </a:endParaRPr>
+                    </a:p>
+                  </a:txBody>
+                  <a:tcPr marL="61066" marR="61066" marT="0" marB="0"/>
+                </a:tc>
+                <a:tc>
+                  <a:txBody>
+                    <a:bodyPr/>
+                    <a:lstStyle/>
+                    <a:p>
+                      <a:pPr>
+                        <a:lnSpc>
+                          <a:spcPct val="107000"/>
+                        </a:lnSpc>
+                        <a:spcAft>
+                          <a:spcPts val="800"/>
+                        </a:spcAft>
+                      </a:pPr>
+                      <a:r>
+                        <a:rPr lang="en-IE" sz="800" b="1" dirty="0">
+                          <a:effectLst/>
+                        </a:rPr>
+                        <a:t>Attachment:</a:t>
+                      </a:r>
+                      <a:endParaRPr lang="en-IE" sz="800" b="1" dirty="0">
+                        <a:effectLst/>
+                        <a:latin typeface="Calibri" panose="020F0502020204030204" pitchFamily="34" charset="0"/>
+                        <a:ea typeface="Calibri" panose="020F0502020204030204" pitchFamily="34" charset="0"/>
+                        <a:cs typeface="Times New Roman" panose="02020603050405020304" pitchFamily="18" charset="0"/>
+                      </a:endParaRPr>
+                    </a:p>
+                  </a:txBody>
+                  <a:tcPr marL="61066" marR="61066" marT="0" marB="0"/>
+                </a:tc>
+              </a:tr>
+              <a:tr h="1549042">
+                <a:tc>
+                  <a:txBody>
+                    <a:bodyPr/>
+                    <a:lstStyle/>
+                    <a:p>
+                      <a:pPr>
+                        <a:lnSpc>
+                          <a:spcPct val="107000"/>
+                        </a:lnSpc>
+                        <a:spcAft>
+                          <a:spcPts val="0"/>
+                        </a:spcAft>
+                      </a:pPr>
+                      <a:r>
+                        <a:rPr lang="en-IE" sz="800" dirty="0" smtClean="0">
+                          <a:effectLst/>
+                          <a:latin typeface="+mn-lt"/>
+                          <a:ea typeface="+mn-ea"/>
+                          <a:cs typeface="+mn-cs"/>
+                        </a:rPr>
+                        <a:t>Navigation Bar</a:t>
+                      </a:r>
+                      <a:endParaRPr lang="en-IE" sz="800" dirty="0">
+                        <a:effectLst/>
+                        <a:latin typeface="Calibri" panose="020F0502020204030204" pitchFamily="34" charset="0"/>
+                        <a:ea typeface="Calibri" panose="020F0502020204030204" pitchFamily="34" charset="0"/>
+                        <a:cs typeface="Times New Roman" panose="02020603050405020304" pitchFamily="18" charset="0"/>
+                      </a:endParaRPr>
+                    </a:p>
+                  </a:txBody>
+                  <a:tcPr marL="61066" marR="61066" marT="0" marB="0"/>
+                </a:tc>
+                <a:tc>
+                  <a:txBody>
+                    <a:bodyPr/>
+                    <a:lstStyle/>
+                    <a:p>
+                      <a:pPr>
+                        <a:lnSpc>
+                          <a:spcPct val="107000"/>
+                        </a:lnSpc>
+                        <a:spcAft>
+                          <a:spcPts val="0"/>
+                        </a:spcAft>
+                      </a:pPr>
+                      <a:r>
+                        <a:rPr lang="en-IE" sz="800" dirty="0" smtClean="0">
+                          <a:effectLst/>
+                        </a:rPr>
+                        <a:t>The clock</a:t>
+                      </a:r>
+                      <a:endParaRPr lang="en-IE" sz="800" dirty="0">
+                        <a:effectLst/>
+                        <a:latin typeface="Calibri" panose="020F0502020204030204" pitchFamily="34" charset="0"/>
+                        <a:ea typeface="Calibri" panose="020F0502020204030204" pitchFamily="34" charset="0"/>
+                        <a:cs typeface="Times New Roman" panose="02020603050405020304" pitchFamily="18" charset="0"/>
+                      </a:endParaRPr>
+                    </a:p>
+                  </a:txBody>
+                  <a:tcPr marL="61066" marR="61066" marT="0" marB="0"/>
+                </a:tc>
+                <a:tc>
+                  <a:txBody>
+                    <a:bodyPr/>
+                    <a:lstStyle/>
+                    <a:p>
+                      <a:pPr>
+                        <a:lnSpc>
+                          <a:spcPct val="107000"/>
+                        </a:lnSpc>
+                        <a:spcAft>
+                          <a:spcPts val="800"/>
+                        </a:spcAft>
+                      </a:pPr>
+                      <a:r>
+                        <a:rPr lang="en-IE" sz="800" i="1" dirty="0">
+                          <a:solidFill>
+                            <a:schemeClr val="tx2">
+                              <a:lumMod val="60000"/>
+                              <a:lumOff val="40000"/>
+                            </a:schemeClr>
+                          </a:solidFill>
+                          <a:effectLst/>
+                        </a:rPr>
+                        <a:t>Give full details of the issue, giving as much detail as possible.</a:t>
+                      </a:r>
+                    </a:p>
+                    <a:p>
+                      <a:pPr>
+                        <a:lnSpc>
+                          <a:spcPct val="107000"/>
+                        </a:lnSpc>
+                        <a:spcAft>
+                          <a:spcPts val="0"/>
+                        </a:spcAft>
+                      </a:pPr>
+                      <a:r>
+                        <a:rPr lang="en-IE" sz="800" dirty="0" smtClean="0">
+                          <a:effectLst/>
+                        </a:rPr>
+                        <a:t>The clock shows the currently time </a:t>
+                      </a:r>
+                      <a:endParaRPr lang="en-IE" sz="800" dirty="0">
+                        <a:effectLst/>
+                        <a:latin typeface="Calibri" panose="020F0502020204030204" pitchFamily="34" charset="0"/>
+                        <a:ea typeface="Calibri" panose="020F0502020204030204" pitchFamily="34" charset="0"/>
+                        <a:cs typeface="Times New Roman" panose="02020603050405020304" pitchFamily="18" charset="0"/>
+                      </a:endParaRPr>
+                    </a:p>
+                  </a:txBody>
+                  <a:tcPr marL="61066" marR="61066" marT="0" marB="0"/>
+                </a:tc>
+                <a:tc>
+                  <a:txBody>
+                    <a:bodyPr/>
+                    <a:lstStyle/>
+                    <a:p>
+                      <a:pPr>
+                        <a:lnSpc>
+                          <a:spcPct val="107000"/>
+                        </a:lnSpc>
+                        <a:spcAft>
+                          <a:spcPts val="800"/>
+                        </a:spcAft>
+                      </a:pPr>
+                      <a:r>
+                        <a:rPr lang="en-IE" sz="800" i="1" dirty="0">
+                          <a:solidFill>
+                            <a:schemeClr val="tx2">
+                              <a:lumMod val="60000"/>
+                              <a:lumOff val="40000"/>
+                            </a:schemeClr>
+                          </a:solidFill>
+                          <a:effectLst/>
+                        </a:rPr>
+                        <a:t>what did the application do after performing the above steps </a:t>
+                      </a:r>
+                    </a:p>
+                    <a:p>
+                      <a:pPr>
+                        <a:lnSpc>
+                          <a:spcPct val="107000"/>
+                        </a:lnSpc>
+                        <a:spcAft>
+                          <a:spcPts val="0"/>
+                        </a:spcAft>
+                      </a:pPr>
+                      <a:r>
+                        <a:rPr lang="en-IE" sz="800" dirty="0" smtClean="0">
+                          <a:effectLst/>
+                        </a:rPr>
+                        <a:t>It is static </a:t>
+                      </a:r>
+                      <a:endParaRPr lang="en-IE" sz="800" dirty="0">
+                        <a:effectLst/>
+                        <a:latin typeface="Calibri" panose="020F0502020204030204" pitchFamily="34" charset="0"/>
+                        <a:ea typeface="Calibri" panose="020F0502020204030204" pitchFamily="34" charset="0"/>
+                        <a:cs typeface="Times New Roman" panose="02020603050405020304" pitchFamily="18" charset="0"/>
+                      </a:endParaRPr>
+                    </a:p>
+                  </a:txBody>
+                  <a:tcPr marL="61066" marR="61066" marT="0" marB="0"/>
+                </a:tc>
+                <a:tc>
+                  <a:txBody>
+                    <a:bodyPr/>
+                    <a:lstStyle/>
+                    <a:p>
+                      <a:pPr>
+                        <a:lnSpc>
+                          <a:spcPct val="107000"/>
+                        </a:lnSpc>
+                        <a:spcAft>
+                          <a:spcPts val="800"/>
+                        </a:spcAft>
+                      </a:pPr>
+                      <a:r>
+                        <a:rPr lang="en-IE" sz="800" i="1" dirty="0">
+                          <a:solidFill>
+                            <a:schemeClr val="tx2">
+                              <a:lumMod val="60000"/>
+                              <a:lumOff val="40000"/>
+                            </a:schemeClr>
+                          </a:solidFill>
+                          <a:effectLst/>
+                        </a:rPr>
+                        <a:t>What the application should have done, if there was no bug. </a:t>
+                      </a:r>
+                    </a:p>
+                    <a:p>
+                      <a:pPr>
+                        <a:lnSpc>
+                          <a:spcPct val="107000"/>
+                        </a:lnSpc>
+                        <a:spcAft>
+                          <a:spcPts val="800"/>
+                        </a:spcAft>
+                      </a:pPr>
+                      <a:r>
+                        <a:rPr lang="en-IE" sz="800" dirty="0" smtClean="0">
+                          <a:effectLst/>
+                        </a:rPr>
+                        <a:t>Current</a:t>
+                      </a:r>
+                      <a:r>
+                        <a:rPr lang="en-IE" sz="800" baseline="0" dirty="0" smtClean="0">
+                          <a:effectLst/>
+                        </a:rPr>
+                        <a:t> time or manage the time from settings</a:t>
+                      </a:r>
+                      <a:endParaRPr lang="en-IE" sz="800" dirty="0">
+                        <a:effectLst/>
+                        <a:latin typeface="Calibri" panose="020F0502020204030204" pitchFamily="34" charset="0"/>
+                        <a:ea typeface="Calibri" panose="020F0502020204030204" pitchFamily="34" charset="0"/>
+                        <a:cs typeface="Times New Roman" panose="02020603050405020304" pitchFamily="18" charset="0"/>
+                      </a:endParaRPr>
+                    </a:p>
+                  </a:txBody>
+                  <a:tcPr marL="61066" marR="61066" marT="0" marB="0"/>
+                </a:tc>
+                <a:tc>
+                  <a:txBody>
+                    <a:bodyPr/>
+                    <a:lstStyle/>
+                    <a:p>
+                      <a:pPr>
+                        <a:lnSpc>
+                          <a:spcPct val="107000"/>
+                        </a:lnSpc>
+                        <a:spcAft>
+                          <a:spcPts val="0"/>
+                        </a:spcAft>
+                      </a:pPr>
+                      <a:r>
+                        <a:rPr lang="en-IE" sz="800" dirty="0">
+                          <a:effectLst/>
+                        </a:rPr>
+                        <a:t> </a:t>
+                      </a:r>
+                      <a:endParaRPr lang="en-IE" sz="800" dirty="0">
+                        <a:effectLst/>
+                        <a:latin typeface="Calibri" panose="020F0502020204030204" pitchFamily="34" charset="0"/>
+                        <a:ea typeface="Calibri" panose="020F0502020204030204" pitchFamily="34" charset="0"/>
+                        <a:cs typeface="Times New Roman" panose="02020603050405020304" pitchFamily="18" charset="0"/>
+                      </a:endParaRPr>
+                    </a:p>
+                  </a:txBody>
+                  <a:tcPr marL="61066" marR="61066" marT="0" marB="0"/>
+                </a:tc>
+                <a:tc>
+                  <a:txBody>
+                    <a:bodyPr/>
+                    <a:lstStyle/>
+                    <a:p>
+                      <a:pPr>
+                        <a:lnSpc>
+                          <a:spcPct val="107000"/>
+                        </a:lnSpc>
+                        <a:spcAft>
+                          <a:spcPts val="0"/>
+                        </a:spcAft>
+                      </a:pPr>
+                      <a:endParaRPr lang="en-IE" sz="800" i="1" dirty="0">
+                        <a:solidFill>
+                          <a:schemeClr val="tx2">
+                            <a:lumMod val="60000"/>
+                            <a:lumOff val="40000"/>
+                          </a:schemeClr>
+                        </a:solidFill>
+                        <a:effectLst/>
+                        <a:latin typeface="Calibri" panose="020F0502020204030204" pitchFamily="34" charset="0"/>
+                        <a:ea typeface="Calibri" panose="020F0502020204030204" pitchFamily="34" charset="0"/>
+                        <a:cs typeface="Times New Roman" panose="02020603050405020304" pitchFamily="18" charset="0"/>
+                      </a:endParaRPr>
+                    </a:p>
+                  </a:txBody>
+                  <a:tcPr marL="61066" marR="61066" marT="0" marB="0"/>
+                </a:tc>
+              </a:tr>
+            </a:tbl>
+          </a:graphicData>
+        </a:graphic>
+      </p:graphicFrame>
+      <p:graphicFrame>
+        <p:nvGraphicFramePr>
+          <p:cNvPr id="8" name="Table 7"/>
+          <p:cNvGraphicFramePr>
+            <a:graphicFrameLocks noGrp="1"/>
+          </p:cNvGraphicFramePr>
+          <p:nvPr>
+            <p:extLst/>
+          </p:nvPr>
+        </p:nvGraphicFramePr>
+        <p:xfrm>
+          <a:off x="317365" y="3164452"/>
+          <a:ext cx="6223269" cy="1783387"/>
+        </p:xfrm>
+        <a:graphic>
+          <a:graphicData uri="http://schemas.openxmlformats.org/drawingml/2006/table">
+            <a:tbl>
+              <a:tblPr firstRow="1" firstCol="1" bandRow="1">
+                <a:tableStyleId>{5940675A-B579-460E-94D1-54222C63F5DA}</a:tableStyleId>
+              </a:tblPr>
+              <a:tblGrid>
+                <a:gridCol w="795297"/>
+                <a:gridCol w="851167"/>
+                <a:gridCol w="882726"/>
+                <a:gridCol w="861976"/>
+                <a:gridCol w="869801"/>
+                <a:gridCol w="1052984"/>
+                <a:gridCol w="909318"/>
+              </a:tblGrid>
+              <a:tr h="234345">
+                <a:tc>
+                  <a:txBody>
+                    <a:bodyPr/>
+                    <a:lstStyle/>
+                    <a:p>
+                      <a:pPr>
+                        <a:lnSpc>
+                          <a:spcPct val="107000"/>
+                        </a:lnSpc>
+                        <a:spcAft>
+                          <a:spcPts val="800"/>
+                        </a:spcAft>
+                      </a:pPr>
+                      <a:r>
+                        <a:rPr lang="en-IE" sz="800" b="1" dirty="0">
+                          <a:effectLst/>
+                        </a:rPr>
+                        <a:t>Screen Name:</a:t>
+                      </a:r>
+                      <a:endParaRPr lang="en-IE" sz="800" b="1" dirty="0">
+                        <a:effectLst/>
+                        <a:latin typeface="Calibri" panose="020F0502020204030204" pitchFamily="34" charset="0"/>
+                        <a:ea typeface="Calibri" panose="020F0502020204030204" pitchFamily="34" charset="0"/>
+                        <a:cs typeface="Times New Roman" panose="02020603050405020304" pitchFamily="18" charset="0"/>
+                      </a:endParaRPr>
+                    </a:p>
+                  </a:txBody>
+                  <a:tcPr marL="61066" marR="61066" marT="0" marB="0"/>
+                </a:tc>
+                <a:tc>
+                  <a:txBody>
+                    <a:bodyPr/>
+                    <a:lstStyle/>
+                    <a:p>
+                      <a:pPr>
+                        <a:lnSpc>
+                          <a:spcPct val="107000"/>
+                        </a:lnSpc>
+                        <a:spcAft>
+                          <a:spcPts val="800"/>
+                        </a:spcAft>
+                      </a:pPr>
+                      <a:r>
+                        <a:rPr lang="en-IE" sz="800" b="1" dirty="0">
+                          <a:effectLst/>
+                        </a:rPr>
+                        <a:t>Summary:</a:t>
+                      </a:r>
+                      <a:endParaRPr lang="en-IE" sz="800" b="1" dirty="0">
+                        <a:effectLst/>
+                        <a:latin typeface="Calibri" panose="020F0502020204030204" pitchFamily="34" charset="0"/>
+                        <a:ea typeface="Calibri" panose="020F0502020204030204" pitchFamily="34" charset="0"/>
+                        <a:cs typeface="Times New Roman" panose="02020603050405020304" pitchFamily="18" charset="0"/>
+                      </a:endParaRPr>
+                    </a:p>
+                  </a:txBody>
+                  <a:tcPr marL="61066" marR="61066" marT="0" marB="0"/>
+                </a:tc>
+                <a:tc>
+                  <a:txBody>
+                    <a:bodyPr/>
+                    <a:lstStyle/>
+                    <a:p>
+                      <a:pPr>
+                        <a:lnSpc>
+                          <a:spcPct val="107000"/>
+                        </a:lnSpc>
+                        <a:spcAft>
+                          <a:spcPts val="800"/>
+                        </a:spcAft>
+                      </a:pPr>
+                      <a:r>
+                        <a:rPr lang="en-IE" sz="800" b="1" dirty="0">
+                          <a:effectLst/>
+                        </a:rPr>
+                        <a:t>Description:</a:t>
+                      </a:r>
+                      <a:endParaRPr lang="en-IE" sz="800" b="1" dirty="0">
+                        <a:effectLst/>
+                        <a:latin typeface="Calibri" panose="020F0502020204030204" pitchFamily="34" charset="0"/>
+                        <a:ea typeface="Calibri" panose="020F0502020204030204" pitchFamily="34" charset="0"/>
+                        <a:cs typeface="Times New Roman" panose="02020603050405020304" pitchFamily="18" charset="0"/>
+                      </a:endParaRPr>
+                    </a:p>
+                  </a:txBody>
+                  <a:tcPr marL="61066" marR="61066" marT="0" marB="0"/>
+                </a:tc>
+                <a:tc>
+                  <a:txBody>
+                    <a:bodyPr/>
+                    <a:lstStyle/>
+                    <a:p>
+                      <a:pPr>
+                        <a:lnSpc>
+                          <a:spcPct val="107000"/>
+                        </a:lnSpc>
+                        <a:spcAft>
+                          <a:spcPts val="800"/>
+                        </a:spcAft>
+                      </a:pPr>
+                      <a:r>
+                        <a:rPr lang="en-IE" sz="800" b="1" dirty="0">
+                          <a:effectLst/>
+                        </a:rPr>
+                        <a:t>Actual Results:</a:t>
+                      </a:r>
+                      <a:endParaRPr lang="en-IE" sz="800" b="1" dirty="0">
+                        <a:effectLst/>
+                        <a:latin typeface="Calibri" panose="020F0502020204030204" pitchFamily="34" charset="0"/>
+                        <a:ea typeface="Calibri" panose="020F0502020204030204" pitchFamily="34" charset="0"/>
+                        <a:cs typeface="Times New Roman" panose="02020603050405020304" pitchFamily="18" charset="0"/>
+                      </a:endParaRPr>
+                    </a:p>
+                  </a:txBody>
+                  <a:tcPr marL="61066" marR="61066" marT="0" marB="0"/>
+                </a:tc>
+                <a:tc>
+                  <a:txBody>
+                    <a:bodyPr/>
+                    <a:lstStyle/>
+                    <a:p>
+                      <a:pPr>
+                        <a:lnSpc>
+                          <a:spcPct val="107000"/>
+                        </a:lnSpc>
+                        <a:spcAft>
+                          <a:spcPts val="800"/>
+                        </a:spcAft>
+                      </a:pPr>
+                      <a:r>
+                        <a:rPr lang="en-IE" sz="800" b="1" dirty="0">
+                          <a:effectLst/>
+                        </a:rPr>
+                        <a:t>Expected Results:</a:t>
+                      </a:r>
+                      <a:endParaRPr lang="en-IE" sz="800" b="1" dirty="0">
+                        <a:effectLst/>
+                        <a:latin typeface="Calibri" panose="020F0502020204030204" pitchFamily="34" charset="0"/>
+                        <a:ea typeface="Calibri" panose="020F0502020204030204" pitchFamily="34" charset="0"/>
+                        <a:cs typeface="Times New Roman" panose="02020603050405020304" pitchFamily="18" charset="0"/>
+                      </a:endParaRPr>
+                    </a:p>
+                  </a:txBody>
+                  <a:tcPr marL="61066" marR="61066" marT="0" marB="0"/>
+                </a:tc>
+                <a:tc>
+                  <a:txBody>
+                    <a:bodyPr/>
+                    <a:lstStyle/>
+                    <a:p>
+                      <a:pPr>
+                        <a:lnSpc>
+                          <a:spcPct val="107000"/>
+                        </a:lnSpc>
+                        <a:spcAft>
+                          <a:spcPts val="800"/>
+                        </a:spcAft>
+                      </a:pPr>
+                      <a:r>
+                        <a:rPr lang="en-IE" sz="800" b="1" dirty="0">
+                          <a:effectLst/>
+                        </a:rPr>
+                        <a:t>Other Information:</a:t>
+                      </a:r>
+                      <a:endParaRPr lang="en-IE" sz="800" b="1" dirty="0">
+                        <a:effectLst/>
+                        <a:latin typeface="Calibri" panose="020F0502020204030204" pitchFamily="34" charset="0"/>
+                        <a:ea typeface="Calibri" panose="020F0502020204030204" pitchFamily="34" charset="0"/>
+                        <a:cs typeface="Times New Roman" panose="02020603050405020304" pitchFamily="18" charset="0"/>
+                      </a:endParaRPr>
+                    </a:p>
+                  </a:txBody>
+                  <a:tcPr marL="61066" marR="61066" marT="0" marB="0"/>
+                </a:tc>
+                <a:tc>
+                  <a:txBody>
+                    <a:bodyPr/>
+                    <a:lstStyle/>
+                    <a:p>
+                      <a:pPr>
+                        <a:lnSpc>
+                          <a:spcPct val="107000"/>
+                        </a:lnSpc>
+                        <a:spcAft>
+                          <a:spcPts val="800"/>
+                        </a:spcAft>
+                      </a:pPr>
+                      <a:r>
+                        <a:rPr lang="en-IE" sz="800" b="1" dirty="0">
+                          <a:effectLst/>
+                        </a:rPr>
+                        <a:t>Attachment:</a:t>
+                      </a:r>
+                      <a:endParaRPr lang="en-IE" sz="800" b="1" dirty="0">
+                        <a:effectLst/>
+                        <a:latin typeface="Calibri" panose="020F0502020204030204" pitchFamily="34" charset="0"/>
+                        <a:ea typeface="Calibri" panose="020F0502020204030204" pitchFamily="34" charset="0"/>
+                        <a:cs typeface="Times New Roman" panose="02020603050405020304" pitchFamily="18" charset="0"/>
+                      </a:endParaRPr>
+                    </a:p>
+                  </a:txBody>
+                  <a:tcPr marL="61066" marR="61066" marT="0" marB="0"/>
+                </a:tc>
+              </a:tr>
+              <a:tr h="1549042">
+                <a:tc>
+                  <a:txBody>
+                    <a:bodyPr/>
+                    <a:lstStyle/>
+                    <a:p>
+                      <a:pPr>
+                        <a:lnSpc>
+                          <a:spcPct val="107000"/>
+                        </a:lnSpc>
+                        <a:spcAft>
+                          <a:spcPts val="0"/>
+                        </a:spcAft>
+                      </a:pPr>
+                      <a:r>
+                        <a:rPr lang="en-IE" sz="800" dirty="0" smtClean="0">
+                          <a:effectLst/>
+                          <a:latin typeface="+mn-lt"/>
+                          <a:ea typeface="+mn-ea"/>
+                          <a:cs typeface="+mn-cs"/>
+                        </a:rPr>
+                        <a:t>Navigation</a:t>
+                      </a:r>
+                      <a:r>
+                        <a:rPr lang="en-IE" sz="800" baseline="0" dirty="0" smtClean="0">
+                          <a:effectLst/>
+                          <a:latin typeface="+mn-lt"/>
+                          <a:ea typeface="+mn-ea"/>
+                          <a:cs typeface="+mn-cs"/>
+                        </a:rPr>
+                        <a:t> Bar</a:t>
+                      </a:r>
+                      <a:endParaRPr lang="en-IE" sz="800" dirty="0">
+                        <a:effectLst/>
+                        <a:latin typeface="Calibri" panose="020F0502020204030204" pitchFamily="34" charset="0"/>
+                        <a:ea typeface="Calibri" panose="020F0502020204030204" pitchFamily="34" charset="0"/>
+                        <a:cs typeface="Times New Roman" panose="02020603050405020304" pitchFamily="18" charset="0"/>
+                      </a:endParaRPr>
+                    </a:p>
+                  </a:txBody>
+                  <a:tcPr marL="61066" marR="61066" marT="0" marB="0"/>
+                </a:tc>
+                <a:tc>
+                  <a:txBody>
+                    <a:bodyPr/>
+                    <a:lstStyle/>
+                    <a:p>
+                      <a:pPr>
+                        <a:lnSpc>
+                          <a:spcPct val="107000"/>
+                        </a:lnSpc>
+                        <a:spcAft>
+                          <a:spcPts val="0"/>
+                        </a:spcAft>
+                      </a:pPr>
+                      <a:r>
+                        <a:rPr lang="en-IE" sz="800" dirty="0" smtClean="0">
+                          <a:effectLst/>
+                          <a:latin typeface="+mn-lt"/>
+                          <a:ea typeface="+mn-ea"/>
+                          <a:cs typeface="+mn-cs"/>
+                        </a:rPr>
+                        <a:t>Help</a:t>
+                      </a:r>
+                      <a:r>
+                        <a:rPr lang="en-IE" sz="800" baseline="0" dirty="0" smtClean="0">
+                          <a:effectLst/>
+                          <a:latin typeface="+mn-lt"/>
+                          <a:ea typeface="+mn-ea"/>
+                          <a:cs typeface="+mn-cs"/>
+                        </a:rPr>
+                        <a:t> button</a:t>
+                      </a:r>
+                      <a:endParaRPr lang="en-IE" sz="800" dirty="0">
+                        <a:effectLst/>
+                        <a:latin typeface="Calibri" panose="020F0502020204030204" pitchFamily="34" charset="0"/>
+                        <a:ea typeface="Calibri" panose="020F0502020204030204" pitchFamily="34" charset="0"/>
+                        <a:cs typeface="Times New Roman" panose="02020603050405020304" pitchFamily="18" charset="0"/>
+                      </a:endParaRPr>
+                    </a:p>
+                  </a:txBody>
+                  <a:tcPr marL="61066" marR="61066" marT="0" marB="0"/>
+                </a:tc>
+                <a:tc>
+                  <a:txBody>
+                    <a:bodyPr/>
+                    <a:lstStyle/>
+                    <a:p>
+                      <a:pPr>
+                        <a:lnSpc>
+                          <a:spcPct val="107000"/>
+                        </a:lnSpc>
+                        <a:spcAft>
+                          <a:spcPts val="800"/>
+                        </a:spcAft>
+                      </a:pPr>
+                      <a:r>
+                        <a:rPr lang="en-IE" sz="800" i="1" dirty="0">
+                          <a:solidFill>
+                            <a:schemeClr val="tx2">
+                              <a:lumMod val="60000"/>
+                              <a:lumOff val="40000"/>
+                            </a:schemeClr>
+                          </a:solidFill>
+                          <a:effectLst/>
+                        </a:rPr>
+                        <a:t>Give full details of the issue, giving as much detail as </a:t>
+                      </a:r>
+                      <a:r>
+                        <a:rPr lang="en-IE" sz="800" i="1" dirty="0" smtClean="0">
+                          <a:solidFill>
+                            <a:schemeClr val="tx2">
+                              <a:lumMod val="60000"/>
+                              <a:lumOff val="40000"/>
+                            </a:schemeClr>
+                          </a:solidFill>
+                          <a:effectLst/>
+                        </a:rPr>
+                        <a:t>possible</a:t>
+                      </a:r>
+                    </a:p>
+                    <a:p>
+                      <a:pPr>
+                        <a:lnSpc>
+                          <a:spcPct val="107000"/>
+                        </a:lnSpc>
+                        <a:spcAft>
+                          <a:spcPts val="800"/>
+                        </a:spcAft>
+                      </a:pPr>
+                      <a:r>
+                        <a:rPr lang="en-IE" sz="800" i="1" dirty="0" smtClean="0">
+                          <a:solidFill>
+                            <a:schemeClr val="tx2">
+                              <a:lumMod val="60000"/>
+                              <a:lumOff val="40000"/>
+                            </a:schemeClr>
+                          </a:solidFill>
+                          <a:effectLst/>
+                        </a:rPr>
+                        <a:t>.</a:t>
+                      </a:r>
+                      <a:r>
+                        <a:rPr lang="en-IE" sz="800" dirty="0" smtClean="0">
+                          <a:effectLst/>
+                        </a:rPr>
+                        <a:t>the ‘Help’ screen will appear</a:t>
+                      </a:r>
+                    </a:p>
+                  </a:txBody>
+                  <a:tcPr marL="61066" marR="61066" marT="0" marB="0"/>
+                </a:tc>
+                <a:tc>
+                  <a:txBody>
+                    <a:bodyPr/>
+                    <a:lstStyle/>
+                    <a:p>
+                      <a:pPr>
+                        <a:lnSpc>
+                          <a:spcPct val="107000"/>
+                        </a:lnSpc>
+                        <a:spcAft>
+                          <a:spcPts val="800"/>
+                        </a:spcAft>
+                      </a:pPr>
+                      <a:r>
+                        <a:rPr lang="en-IE" sz="800" i="1" dirty="0">
+                          <a:solidFill>
+                            <a:schemeClr val="tx2">
+                              <a:lumMod val="60000"/>
+                              <a:lumOff val="40000"/>
+                            </a:schemeClr>
+                          </a:solidFill>
+                          <a:effectLst/>
+                        </a:rPr>
+                        <a:t>what did the application do after performing the above steps </a:t>
+                      </a:r>
+                    </a:p>
+                    <a:p>
+                      <a:pPr>
+                        <a:lnSpc>
+                          <a:spcPct val="107000"/>
+                        </a:lnSpc>
+                        <a:spcAft>
+                          <a:spcPts val="0"/>
+                        </a:spcAft>
+                      </a:pPr>
+                      <a:r>
+                        <a:rPr lang="en-IE" sz="800" dirty="0" smtClean="0">
+                          <a:effectLst/>
+                        </a:rPr>
+                        <a:t>Nothing happen when</a:t>
+                      </a:r>
+                      <a:r>
+                        <a:rPr lang="en-IE" sz="800" baseline="0" dirty="0" smtClean="0">
+                          <a:effectLst/>
+                        </a:rPr>
+                        <a:t> the user press this button</a:t>
+                      </a:r>
+                      <a:endParaRPr lang="en-IE" sz="800" dirty="0">
+                        <a:effectLst/>
+                        <a:latin typeface="Calibri" panose="020F0502020204030204" pitchFamily="34" charset="0"/>
+                        <a:ea typeface="Calibri" panose="020F0502020204030204" pitchFamily="34" charset="0"/>
+                        <a:cs typeface="Times New Roman" panose="02020603050405020304" pitchFamily="18" charset="0"/>
+                      </a:endParaRPr>
+                    </a:p>
+                  </a:txBody>
+                  <a:tcPr marL="61066" marR="61066" marT="0" marB="0"/>
+                </a:tc>
+                <a:tc>
+                  <a:txBody>
+                    <a:bodyPr/>
+                    <a:lstStyle/>
+                    <a:p>
+                      <a:pPr>
+                        <a:lnSpc>
+                          <a:spcPct val="107000"/>
+                        </a:lnSpc>
+                        <a:spcAft>
+                          <a:spcPts val="800"/>
+                        </a:spcAft>
+                      </a:pPr>
+                      <a:r>
+                        <a:rPr lang="en-IE" sz="800" i="1" dirty="0">
+                          <a:solidFill>
+                            <a:schemeClr val="tx2">
+                              <a:lumMod val="60000"/>
+                              <a:lumOff val="40000"/>
+                            </a:schemeClr>
+                          </a:solidFill>
+                          <a:effectLst/>
+                        </a:rPr>
+                        <a:t>What the application should have done, if there was no bug. </a:t>
+                      </a:r>
+                    </a:p>
+                    <a:p>
+                      <a:pPr>
+                        <a:lnSpc>
+                          <a:spcPct val="107000"/>
+                        </a:lnSpc>
+                        <a:spcAft>
+                          <a:spcPts val="800"/>
+                        </a:spcAft>
+                      </a:pPr>
+                      <a:r>
+                        <a:rPr lang="en-IE" sz="800" dirty="0" smtClean="0">
+                          <a:effectLst/>
+                        </a:rPr>
+                        <a:t>Full screen</a:t>
+                      </a:r>
+                      <a:r>
+                        <a:rPr lang="en-IE" sz="800" baseline="0" dirty="0" smtClean="0">
+                          <a:effectLst/>
+                        </a:rPr>
+                        <a:t> will appear with help information.</a:t>
+                      </a:r>
+                      <a:endParaRPr lang="en-IE" sz="800" dirty="0">
+                        <a:effectLst/>
+                        <a:latin typeface="Calibri" panose="020F0502020204030204" pitchFamily="34" charset="0"/>
+                        <a:ea typeface="Calibri" panose="020F0502020204030204" pitchFamily="34" charset="0"/>
+                        <a:cs typeface="Times New Roman" panose="02020603050405020304" pitchFamily="18" charset="0"/>
+                      </a:endParaRPr>
+                    </a:p>
+                  </a:txBody>
+                  <a:tcPr marL="61066" marR="61066" marT="0" marB="0"/>
+                </a:tc>
+                <a:tc>
+                  <a:txBody>
+                    <a:bodyPr/>
+                    <a:lstStyle/>
+                    <a:p>
+                      <a:pPr>
+                        <a:lnSpc>
+                          <a:spcPct val="107000"/>
+                        </a:lnSpc>
+                        <a:spcAft>
+                          <a:spcPts val="800"/>
+                        </a:spcAft>
+                      </a:pPr>
+                      <a:r>
+                        <a:rPr lang="en-IE" sz="800" i="1" dirty="0" smtClean="0">
+                          <a:solidFill>
+                            <a:schemeClr val="tx2">
+                              <a:lumMod val="60000"/>
+                              <a:lumOff val="40000"/>
+                            </a:schemeClr>
+                          </a:solidFill>
+                          <a:effectLst/>
+                        </a:rPr>
+                        <a:t> </a:t>
+                      </a:r>
+                      <a:r>
+                        <a:rPr lang="en-IE" sz="800" dirty="0">
+                          <a:effectLst/>
+                        </a:rPr>
+                        <a:t> </a:t>
+                      </a:r>
+                      <a:endParaRPr lang="en-IE" sz="800" dirty="0">
+                        <a:effectLst/>
+                        <a:latin typeface="Calibri" panose="020F0502020204030204" pitchFamily="34" charset="0"/>
+                        <a:ea typeface="Calibri" panose="020F0502020204030204" pitchFamily="34" charset="0"/>
+                        <a:cs typeface="Times New Roman" panose="02020603050405020304" pitchFamily="18" charset="0"/>
+                      </a:endParaRPr>
+                    </a:p>
+                  </a:txBody>
+                  <a:tcPr marL="61066" marR="61066" marT="0" marB="0"/>
+                </a:tc>
+                <a:tc>
+                  <a:txBody>
+                    <a:bodyPr/>
+                    <a:lstStyle/>
+                    <a:p>
+                      <a:pPr>
+                        <a:lnSpc>
+                          <a:spcPct val="107000"/>
+                        </a:lnSpc>
+                        <a:spcAft>
+                          <a:spcPts val="0"/>
+                        </a:spcAft>
+                      </a:pPr>
+                      <a:endParaRPr lang="en-IE" sz="800" i="1" dirty="0">
+                        <a:solidFill>
+                          <a:schemeClr val="tx2">
+                            <a:lumMod val="60000"/>
+                            <a:lumOff val="40000"/>
+                          </a:schemeClr>
+                        </a:solidFill>
+                        <a:effectLst/>
+                        <a:latin typeface="Calibri" panose="020F0502020204030204" pitchFamily="34" charset="0"/>
+                        <a:ea typeface="Calibri" panose="020F0502020204030204" pitchFamily="34" charset="0"/>
+                        <a:cs typeface="Times New Roman" panose="02020603050405020304" pitchFamily="18" charset="0"/>
+                      </a:endParaRPr>
+                    </a:p>
+                  </a:txBody>
+                  <a:tcPr marL="61066" marR="61066" marT="0" marB="0"/>
+                </a:tc>
+              </a:tr>
+            </a:tbl>
+          </a:graphicData>
+        </a:graphic>
+      </p:graphicFrame>
+      <p:graphicFrame>
+        <p:nvGraphicFramePr>
+          <p:cNvPr id="9" name="Table 8"/>
+          <p:cNvGraphicFramePr>
+            <a:graphicFrameLocks noGrp="1"/>
+          </p:cNvGraphicFramePr>
+          <p:nvPr>
+            <p:extLst/>
+          </p:nvPr>
+        </p:nvGraphicFramePr>
+        <p:xfrm>
+          <a:off x="317365" y="5139166"/>
+          <a:ext cx="6223269" cy="2031522"/>
+        </p:xfrm>
+        <a:graphic>
+          <a:graphicData uri="http://schemas.openxmlformats.org/drawingml/2006/table">
+            <a:tbl>
+              <a:tblPr firstRow="1" firstCol="1" bandRow="1">
+                <a:tableStyleId>{5940675A-B579-460E-94D1-54222C63F5DA}</a:tableStyleId>
+              </a:tblPr>
+              <a:tblGrid>
+                <a:gridCol w="795297"/>
+                <a:gridCol w="851167"/>
+                <a:gridCol w="880813"/>
+                <a:gridCol w="863889"/>
+                <a:gridCol w="869801"/>
+                <a:gridCol w="1052984"/>
+                <a:gridCol w="909318"/>
+              </a:tblGrid>
+              <a:tr h="234345">
+                <a:tc>
+                  <a:txBody>
+                    <a:bodyPr/>
+                    <a:lstStyle/>
+                    <a:p>
+                      <a:pPr>
+                        <a:lnSpc>
+                          <a:spcPct val="107000"/>
+                        </a:lnSpc>
+                        <a:spcAft>
+                          <a:spcPts val="800"/>
+                        </a:spcAft>
+                      </a:pPr>
+                      <a:r>
+                        <a:rPr lang="en-IE" sz="800" b="1" dirty="0">
+                          <a:effectLst/>
+                        </a:rPr>
+                        <a:t>Screen Name:</a:t>
+                      </a:r>
+                      <a:endParaRPr lang="en-IE" sz="800" b="1" dirty="0">
+                        <a:effectLst/>
+                        <a:latin typeface="Calibri" panose="020F0502020204030204" pitchFamily="34" charset="0"/>
+                        <a:ea typeface="Calibri" panose="020F0502020204030204" pitchFamily="34" charset="0"/>
+                        <a:cs typeface="Times New Roman" panose="02020603050405020304" pitchFamily="18" charset="0"/>
+                      </a:endParaRPr>
+                    </a:p>
+                  </a:txBody>
+                  <a:tcPr marL="61066" marR="61066" marT="0" marB="0"/>
+                </a:tc>
+                <a:tc>
+                  <a:txBody>
+                    <a:bodyPr/>
+                    <a:lstStyle/>
+                    <a:p>
+                      <a:pPr>
+                        <a:lnSpc>
+                          <a:spcPct val="107000"/>
+                        </a:lnSpc>
+                        <a:spcAft>
+                          <a:spcPts val="800"/>
+                        </a:spcAft>
+                      </a:pPr>
+                      <a:r>
+                        <a:rPr lang="en-IE" sz="800" b="1" dirty="0">
+                          <a:effectLst/>
+                        </a:rPr>
+                        <a:t>Summary:</a:t>
+                      </a:r>
+                      <a:endParaRPr lang="en-IE" sz="800" b="1" dirty="0">
+                        <a:effectLst/>
+                        <a:latin typeface="Calibri" panose="020F0502020204030204" pitchFamily="34" charset="0"/>
+                        <a:ea typeface="Calibri" panose="020F0502020204030204" pitchFamily="34" charset="0"/>
+                        <a:cs typeface="Times New Roman" panose="02020603050405020304" pitchFamily="18" charset="0"/>
+                      </a:endParaRPr>
+                    </a:p>
+                  </a:txBody>
+                  <a:tcPr marL="61066" marR="61066" marT="0" marB="0"/>
+                </a:tc>
+                <a:tc>
+                  <a:txBody>
+                    <a:bodyPr/>
+                    <a:lstStyle/>
+                    <a:p>
+                      <a:pPr>
+                        <a:lnSpc>
+                          <a:spcPct val="107000"/>
+                        </a:lnSpc>
+                        <a:spcAft>
+                          <a:spcPts val="800"/>
+                        </a:spcAft>
+                      </a:pPr>
+                      <a:r>
+                        <a:rPr lang="en-IE" sz="800" b="1" dirty="0">
+                          <a:effectLst/>
+                        </a:rPr>
+                        <a:t>Description:</a:t>
+                      </a:r>
+                      <a:endParaRPr lang="en-IE" sz="800" b="1" dirty="0">
+                        <a:effectLst/>
+                        <a:latin typeface="Calibri" panose="020F0502020204030204" pitchFamily="34" charset="0"/>
+                        <a:ea typeface="Calibri" panose="020F0502020204030204" pitchFamily="34" charset="0"/>
+                        <a:cs typeface="Times New Roman" panose="02020603050405020304" pitchFamily="18" charset="0"/>
+                      </a:endParaRPr>
+                    </a:p>
+                  </a:txBody>
+                  <a:tcPr marL="61066" marR="61066" marT="0" marB="0"/>
+                </a:tc>
+                <a:tc>
+                  <a:txBody>
+                    <a:bodyPr/>
+                    <a:lstStyle/>
+                    <a:p>
+                      <a:pPr>
+                        <a:lnSpc>
+                          <a:spcPct val="107000"/>
+                        </a:lnSpc>
+                        <a:spcAft>
+                          <a:spcPts val="800"/>
+                        </a:spcAft>
+                      </a:pPr>
+                      <a:r>
+                        <a:rPr lang="en-IE" sz="800" b="1" dirty="0">
+                          <a:effectLst/>
+                        </a:rPr>
+                        <a:t>Actual Results:</a:t>
+                      </a:r>
+                      <a:endParaRPr lang="en-IE" sz="800" b="1" dirty="0">
+                        <a:effectLst/>
+                        <a:latin typeface="Calibri" panose="020F0502020204030204" pitchFamily="34" charset="0"/>
+                        <a:ea typeface="Calibri" panose="020F0502020204030204" pitchFamily="34" charset="0"/>
+                        <a:cs typeface="Times New Roman" panose="02020603050405020304" pitchFamily="18" charset="0"/>
+                      </a:endParaRPr>
+                    </a:p>
+                  </a:txBody>
+                  <a:tcPr marL="61066" marR="61066" marT="0" marB="0"/>
+                </a:tc>
+                <a:tc>
+                  <a:txBody>
+                    <a:bodyPr/>
+                    <a:lstStyle/>
+                    <a:p>
+                      <a:pPr>
+                        <a:lnSpc>
+                          <a:spcPct val="107000"/>
+                        </a:lnSpc>
+                        <a:spcAft>
+                          <a:spcPts val="800"/>
+                        </a:spcAft>
+                      </a:pPr>
+                      <a:r>
+                        <a:rPr lang="en-IE" sz="800" b="1" dirty="0">
+                          <a:effectLst/>
+                        </a:rPr>
+                        <a:t>Expected Results:</a:t>
+                      </a:r>
+                      <a:endParaRPr lang="en-IE" sz="800" b="1" dirty="0">
+                        <a:effectLst/>
+                        <a:latin typeface="Calibri" panose="020F0502020204030204" pitchFamily="34" charset="0"/>
+                        <a:ea typeface="Calibri" panose="020F0502020204030204" pitchFamily="34" charset="0"/>
+                        <a:cs typeface="Times New Roman" panose="02020603050405020304" pitchFamily="18" charset="0"/>
+                      </a:endParaRPr>
+                    </a:p>
+                  </a:txBody>
+                  <a:tcPr marL="61066" marR="61066" marT="0" marB="0"/>
+                </a:tc>
+                <a:tc>
+                  <a:txBody>
+                    <a:bodyPr/>
+                    <a:lstStyle/>
+                    <a:p>
+                      <a:pPr>
+                        <a:lnSpc>
+                          <a:spcPct val="107000"/>
+                        </a:lnSpc>
+                        <a:spcAft>
+                          <a:spcPts val="800"/>
+                        </a:spcAft>
+                      </a:pPr>
+                      <a:r>
+                        <a:rPr lang="en-IE" sz="800" b="1" dirty="0">
+                          <a:effectLst/>
+                        </a:rPr>
+                        <a:t>Other Information:</a:t>
+                      </a:r>
+                      <a:endParaRPr lang="en-IE" sz="800" b="1" dirty="0">
+                        <a:effectLst/>
+                        <a:latin typeface="Calibri" panose="020F0502020204030204" pitchFamily="34" charset="0"/>
+                        <a:ea typeface="Calibri" panose="020F0502020204030204" pitchFamily="34" charset="0"/>
+                        <a:cs typeface="Times New Roman" panose="02020603050405020304" pitchFamily="18" charset="0"/>
+                      </a:endParaRPr>
+                    </a:p>
+                  </a:txBody>
+                  <a:tcPr marL="61066" marR="61066" marT="0" marB="0"/>
+                </a:tc>
+                <a:tc>
+                  <a:txBody>
+                    <a:bodyPr/>
+                    <a:lstStyle/>
+                    <a:p>
+                      <a:pPr>
+                        <a:lnSpc>
+                          <a:spcPct val="107000"/>
+                        </a:lnSpc>
+                        <a:spcAft>
+                          <a:spcPts val="800"/>
+                        </a:spcAft>
+                      </a:pPr>
+                      <a:r>
+                        <a:rPr lang="en-IE" sz="800" b="1" dirty="0">
+                          <a:effectLst/>
+                        </a:rPr>
+                        <a:t>Attachment:</a:t>
+                      </a:r>
+                      <a:endParaRPr lang="en-IE" sz="800" b="1" dirty="0">
+                        <a:effectLst/>
+                        <a:latin typeface="Calibri" panose="020F0502020204030204" pitchFamily="34" charset="0"/>
+                        <a:ea typeface="Calibri" panose="020F0502020204030204" pitchFamily="34" charset="0"/>
+                        <a:cs typeface="Times New Roman" panose="02020603050405020304" pitchFamily="18" charset="0"/>
+                      </a:endParaRPr>
+                    </a:p>
+                  </a:txBody>
+                  <a:tcPr marL="61066" marR="61066" marT="0" marB="0"/>
+                </a:tc>
+              </a:tr>
+              <a:tr h="1549042">
+                <a:tc>
+                  <a:txBody>
+                    <a:bodyPr/>
+                    <a:lstStyle/>
+                    <a:p>
+                      <a:pPr>
+                        <a:lnSpc>
+                          <a:spcPct val="107000"/>
+                        </a:lnSpc>
+                        <a:spcAft>
+                          <a:spcPts val="0"/>
+                        </a:spcAft>
+                      </a:pPr>
+                      <a:r>
+                        <a:rPr lang="en-IE" sz="800" dirty="0" smtClean="0">
+                          <a:effectLst/>
+                        </a:rPr>
+                        <a:t>Navigation</a:t>
+                      </a:r>
+                      <a:r>
+                        <a:rPr lang="en-IE" sz="800" baseline="0" dirty="0" smtClean="0">
+                          <a:effectLst/>
+                        </a:rPr>
+                        <a:t> Bar</a:t>
+                      </a:r>
+                      <a:endParaRPr lang="en-IE" sz="800" dirty="0">
+                        <a:effectLst/>
+                        <a:latin typeface="Calibri" panose="020F0502020204030204" pitchFamily="34" charset="0"/>
+                        <a:ea typeface="Calibri" panose="020F0502020204030204" pitchFamily="34" charset="0"/>
+                        <a:cs typeface="Times New Roman" panose="02020603050405020304" pitchFamily="18" charset="0"/>
+                      </a:endParaRPr>
+                    </a:p>
+                  </a:txBody>
+                  <a:tcPr marL="61066" marR="61066" marT="0" marB="0"/>
+                </a:tc>
+                <a:tc>
+                  <a:txBody>
+                    <a:bodyPr/>
+                    <a:lstStyle/>
+                    <a:p>
+                      <a:pPr>
+                        <a:lnSpc>
+                          <a:spcPct val="107000"/>
+                        </a:lnSpc>
+                        <a:spcAft>
+                          <a:spcPts val="0"/>
+                        </a:spcAft>
+                      </a:pPr>
+                      <a:r>
+                        <a:rPr lang="en-IE" sz="800" dirty="0" smtClean="0">
+                          <a:effectLst/>
+                        </a:rPr>
+                        <a:t>Settings</a:t>
+                      </a:r>
+                      <a:endParaRPr lang="en-IE" sz="800" dirty="0">
+                        <a:effectLst/>
+                        <a:latin typeface="Calibri" panose="020F0502020204030204" pitchFamily="34" charset="0"/>
+                        <a:ea typeface="Calibri" panose="020F0502020204030204" pitchFamily="34" charset="0"/>
+                        <a:cs typeface="Times New Roman" panose="02020603050405020304" pitchFamily="18" charset="0"/>
+                      </a:endParaRPr>
+                    </a:p>
+                  </a:txBody>
+                  <a:tcPr marL="61066" marR="61066" marT="0" marB="0"/>
+                </a:tc>
+                <a:tc>
+                  <a:txBody>
+                    <a:bodyPr/>
+                    <a:lstStyle/>
+                    <a:p>
+                      <a:pPr>
+                        <a:lnSpc>
+                          <a:spcPct val="107000"/>
+                        </a:lnSpc>
+                        <a:spcAft>
+                          <a:spcPts val="800"/>
+                        </a:spcAft>
+                      </a:pPr>
+                      <a:r>
+                        <a:rPr lang="en-IE" sz="800" i="1" dirty="0">
+                          <a:solidFill>
+                            <a:schemeClr val="tx2">
+                              <a:lumMod val="60000"/>
+                              <a:lumOff val="40000"/>
+                            </a:schemeClr>
+                          </a:solidFill>
+                          <a:effectLst/>
+                        </a:rPr>
+                        <a:t>Give full details of the issue, giving as much detail as possible.</a:t>
+                      </a:r>
+                    </a:p>
+                    <a:p>
+                      <a:pPr>
+                        <a:lnSpc>
+                          <a:spcPct val="107000"/>
+                        </a:lnSpc>
+                        <a:spcAft>
+                          <a:spcPts val="0"/>
+                        </a:spcAft>
+                      </a:pPr>
+                      <a:r>
+                        <a:rPr lang="en-IE" sz="800" dirty="0" smtClean="0">
+                          <a:effectLst/>
+                        </a:rPr>
+                        <a:t>the user presses on the ‘Settings’ button the settings will appear on a full screen interface.</a:t>
+                      </a:r>
+                    </a:p>
+                    <a:p>
+                      <a:pPr>
+                        <a:lnSpc>
+                          <a:spcPct val="107000"/>
+                        </a:lnSpc>
+                        <a:spcAft>
+                          <a:spcPts val="0"/>
+                        </a:spcAft>
+                      </a:pPr>
+                      <a:r>
+                        <a:rPr lang="en-IE" sz="800" dirty="0" smtClean="0">
+                          <a:effectLst/>
+                        </a:rPr>
+                        <a:t>It</a:t>
+                      </a:r>
+                      <a:r>
+                        <a:rPr lang="en-IE" sz="800" baseline="0" dirty="0" smtClean="0">
+                          <a:effectLst/>
+                        </a:rPr>
+                        <a:t> allows the user to manage analytics</a:t>
+                      </a:r>
+                      <a:r>
+                        <a:rPr lang="en-IE" sz="800" dirty="0" smtClean="0">
+                          <a:effectLst/>
+                        </a:rPr>
+                        <a:t> </a:t>
+                      </a:r>
+                      <a:endParaRPr lang="en-IE" sz="800" dirty="0">
+                        <a:effectLst/>
+                        <a:latin typeface="Calibri" panose="020F0502020204030204" pitchFamily="34" charset="0"/>
+                        <a:ea typeface="Calibri" panose="020F0502020204030204" pitchFamily="34" charset="0"/>
+                        <a:cs typeface="Times New Roman" panose="02020603050405020304" pitchFamily="18" charset="0"/>
+                      </a:endParaRPr>
+                    </a:p>
+                  </a:txBody>
+                  <a:tcPr marL="61066" marR="61066" marT="0" marB="0"/>
+                </a:tc>
+                <a:tc>
+                  <a:txBody>
+                    <a:bodyPr/>
+                    <a:lstStyle/>
+                    <a:p>
+                      <a:pPr>
+                        <a:lnSpc>
+                          <a:spcPct val="107000"/>
+                        </a:lnSpc>
+                        <a:spcAft>
+                          <a:spcPts val="800"/>
+                        </a:spcAft>
+                      </a:pPr>
+                      <a:r>
+                        <a:rPr lang="en-IE" sz="800" i="1" dirty="0">
+                          <a:solidFill>
+                            <a:schemeClr val="tx2">
+                              <a:lumMod val="60000"/>
+                              <a:lumOff val="40000"/>
+                            </a:schemeClr>
+                          </a:solidFill>
+                          <a:effectLst/>
+                        </a:rPr>
+                        <a:t>what did the application do after performing the above steps </a:t>
+                      </a:r>
+                    </a:p>
+                    <a:p>
+                      <a:pPr>
+                        <a:lnSpc>
+                          <a:spcPct val="107000"/>
+                        </a:lnSpc>
+                        <a:spcAft>
+                          <a:spcPts val="0"/>
+                        </a:spcAft>
+                      </a:pPr>
+                      <a:r>
+                        <a:rPr lang="en-IE" sz="800" dirty="0" smtClean="0">
+                          <a:effectLst/>
+                          <a:latin typeface="+mn-lt"/>
+                          <a:ea typeface="+mn-ea"/>
+                          <a:cs typeface="+mn-cs"/>
+                        </a:rPr>
+                        <a:t>The</a:t>
+                      </a:r>
+                      <a:r>
+                        <a:rPr lang="en-IE" sz="800" baseline="0" dirty="0" smtClean="0">
+                          <a:effectLst/>
+                          <a:latin typeface="+mn-lt"/>
+                          <a:ea typeface="+mn-ea"/>
+                          <a:cs typeface="+mn-cs"/>
+                        </a:rPr>
+                        <a:t> user cannot manage the analytics because they have not defined yet.</a:t>
+                      </a:r>
+                      <a:endParaRPr lang="en-IE" sz="800" dirty="0">
+                        <a:effectLst/>
+                        <a:latin typeface="Calibri" panose="020F0502020204030204" pitchFamily="34" charset="0"/>
+                        <a:ea typeface="Calibri" panose="020F0502020204030204" pitchFamily="34" charset="0"/>
+                        <a:cs typeface="Times New Roman" panose="02020603050405020304" pitchFamily="18" charset="0"/>
+                      </a:endParaRPr>
+                    </a:p>
+                  </a:txBody>
+                  <a:tcPr marL="61066" marR="61066" marT="0" marB="0"/>
+                </a:tc>
+                <a:tc>
+                  <a:txBody>
+                    <a:bodyPr/>
+                    <a:lstStyle/>
+                    <a:p>
+                      <a:pPr>
+                        <a:lnSpc>
+                          <a:spcPct val="107000"/>
+                        </a:lnSpc>
+                        <a:spcAft>
+                          <a:spcPts val="800"/>
+                        </a:spcAft>
+                      </a:pPr>
+                      <a:r>
+                        <a:rPr lang="en-IE" sz="800" i="1" dirty="0">
+                          <a:solidFill>
+                            <a:schemeClr val="tx2">
+                              <a:lumMod val="60000"/>
+                              <a:lumOff val="40000"/>
+                            </a:schemeClr>
+                          </a:solidFill>
+                          <a:effectLst/>
+                        </a:rPr>
+                        <a:t>What the application should have done, if there was no bug. </a:t>
+                      </a:r>
+                    </a:p>
+                    <a:p>
+                      <a:pPr>
+                        <a:lnSpc>
+                          <a:spcPct val="107000"/>
+                        </a:lnSpc>
+                        <a:spcAft>
+                          <a:spcPts val="800"/>
+                        </a:spcAft>
+                      </a:pPr>
+                      <a:r>
+                        <a:rPr lang="en-IE" sz="800" dirty="0" smtClean="0">
+                          <a:effectLst/>
+                        </a:rPr>
+                        <a:t>Manage the analytics</a:t>
+                      </a:r>
+                      <a:r>
+                        <a:rPr lang="en-IE" sz="800" baseline="0" dirty="0" smtClean="0">
+                          <a:effectLst/>
+                        </a:rPr>
+                        <a:t> </a:t>
+                      </a:r>
+                      <a:endParaRPr lang="en-IE" sz="800" dirty="0">
+                        <a:effectLst/>
+                        <a:latin typeface="Calibri" panose="020F0502020204030204" pitchFamily="34" charset="0"/>
+                        <a:ea typeface="Calibri" panose="020F0502020204030204" pitchFamily="34" charset="0"/>
+                        <a:cs typeface="Times New Roman" panose="02020603050405020304" pitchFamily="18" charset="0"/>
+                      </a:endParaRPr>
+                    </a:p>
+                  </a:txBody>
+                  <a:tcPr marL="61066" marR="61066" marT="0" marB="0"/>
+                </a:tc>
+                <a:tc>
+                  <a:txBody>
+                    <a:bodyPr/>
+                    <a:lstStyle/>
+                    <a:p>
+                      <a:pPr>
+                        <a:lnSpc>
+                          <a:spcPct val="107000"/>
+                        </a:lnSpc>
+                        <a:spcAft>
+                          <a:spcPts val="800"/>
+                        </a:spcAft>
+                      </a:pPr>
+                      <a:r>
+                        <a:rPr lang="en-IE" sz="800" i="1" dirty="0" smtClean="0">
+                          <a:solidFill>
+                            <a:schemeClr val="tx2">
+                              <a:lumMod val="60000"/>
+                              <a:lumOff val="40000"/>
+                            </a:schemeClr>
+                          </a:solidFill>
+                          <a:effectLst/>
+                        </a:rPr>
+                        <a:t>TBD</a:t>
+                      </a:r>
+                      <a:endParaRPr lang="en-IE" sz="800" i="1" dirty="0">
+                        <a:solidFill>
+                          <a:schemeClr val="tx2">
+                            <a:lumMod val="60000"/>
+                            <a:lumOff val="40000"/>
+                          </a:schemeClr>
+                        </a:solidFill>
+                        <a:effectLst/>
+                      </a:endParaRPr>
+                    </a:p>
+                    <a:p>
+                      <a:pPr>
+                        <a:lnSpc>
+                          <a:spcPct val="107000"/>
+                        </a:lnSpc>
+                        <a:spcAft>
+                          <a:spcPts val="0"/>
+                        </a:spcAft>
+                      </a:pPr>
+                      <a:r>
+                        <a:rPr lang="en-IE" sz="800" dirty="0">
+                          <a:effectLst/>
+                        </a:rPr>
+                        <a:t> </a:t>
+                      </a:r>
+                      <a:endParaRPr lang="en-IE" sz="800" dirty="0">
+                        <a:effectLst/>
+                        <a:latin typeface="Calibri" panose="020F0502020204030204" pitchFamily="34" charset="0"/>
+                        <a:ea typeface="Calibri" panose="020F0502020204030204" pitchFamily="34" charset="0"/>
+                        <a:cs typeface="Times New Roman" panose="02020603050405020304" pitchFamily="18" charset="0"/>
+                      </a:endParaRPr>
+                    </a:p>
+                  </a:txBody>
+                  <a:tcPr marL="61066" marR="61066" marT="0" marB="0"/>
+                </a:tc>
+                <a:tc>
+                  <a:txBody>
+                    <a:bodyPr/>
+                    <a:lstStyle/>
+                    <a:p>
+                      <a:pPr>
+                        <a:lnSpc>
+                          <a:spcPct val="107000"/>
+                        </a:lnSpc>
+                        <a:spcAft>
+                          <a:spcPts val="0"/>
+                        </a:spcAft>
+                      </a:pPr>
+                      <a:endParaRPr lang="en-IE" sz="800" i="1" dirty="0">
+                        <a:solidFill>
+                          <a:schemeClr val="tx2">
+                            <a:lumMod val="60000"/>
+                            <a:lumOff val="40000"/>
+                          </a:schemeClr>
+                        </a:solidFill>
+                        <a:effectLst/>
+                        <a:latin typeface="Calibri" panose="020F0502020204030204" pitchFamily="34" charset="0"/>
+                        <a:ea typeface="Calibri" panose="020F0502020204030204" pitchFamily="34" charset="0"/>
+                        <a:cs typeface="Times New Roman" panose="02020603050405020304" pitchFamily="18" charset="0"/>
+                      </a:endParaRPr>
+                    </a:p>
+                  </a:txBody>
+                  <a:tcPr marL="61066" marR="61066" marT="0" marB="0"/>
+                </a:tc>
+              </a:tr>
+            </a:tbl>
+          </a:graphicData>
+        </a:graphic>
+      </p:graphicFrame>
+      <p:graphicFrame>
+        <p:nvGraphicFramePr>
+          <p:cNvPr id="10" name="Table 9"/>
+          <p:cNvGraphicFramePr>
+            <a:graphicFrameLocks noGrp="1"/>
+          </p:cNvGraphicFramePr>
+          <p:nvPr>
+            <p:extLst/>
+          </p:nvPr>
+        </p:nvGraphicFramePr>
+        <p:xfrm>
+          <a:off x="317365" y="7538656"/>
+          <a:ext cx="6223269" cy="1783387"/>
+        </p:xfrm>
+        <a:graphic>
+          <a:graphicData uri="http://schemas.openxmlformats.org/drawingml/2006/table">
+            <a:tbl>
+              <a:tblPr firstRow="1" firstCol="1" bandRow="1">
+                <a:tableStyleId>{5940675A-B579-460E-94D1-54222C63F5DA}</a:tableStyleId>
+              </a:tblPr>
+              <a:tblGrid>
+                <a:gridCol w="795297"/>
+                <a:gridCol w="851167"/>
+                <a:gridCol w="880813"/>
+                <a:gridCol w="863889"/>
+                <a:gridCol w="869801"/>
+                <a:gridCol w="1052984"/>
+                <a:gridCol w="909318"/>
+              </a:tblGrid>
+              <a:tr h="234345">
+                <a:tc>
+                  <a:txBody>
+                    <a:bodyPr/>
+                    <a:lstStyle/>
+                    <a:p>
+                      <a:pPr>
+                        <a:lnSpc>
+                          <a:spcPct val="107000"/>
+                        </a:lnSpc>
+                        <a:spcAft>
+                          <a:spcPts val="800"/>
+                        </a:spcAft>
+                      </a:pPr>
+                      <a:r>
+                        <a:rPr lang="en-IE" sz="800" b="1" dirty="0">
+                          <a:effectLst/>
+                        </a:rPr>
+                        <a:t>Screen Name:</a:t>
+                      </a:r>
+                      <a:endParaRPr lang="en-IE" sz="800" b="1" dirty="0">
+                        <a:effectLst/>
+                        <a:latin typeface="Calibri" panose="020F0502020204030204" pitchFamily="34" charset="0"/>
+                        <a:ea typeface="Calibri" panose="020F0502020204030204" pitchFamily="34" charset="0"/>
+                        <a:cs typeface="Times New Roman" panose="02020603050405020304" pitchFamily="18" charset="0"/>
+                      </a:endParaRPr>
+                    </a:p>
+                  </a:txBody>
+                  <a:tcPr marL="61066" marR="61066" marT="0" marB="0"/>
+                </a:tc>
+                <a:tc>
+                  <a:txBody>
+                    <a:bodyPr/>
+                    <a:lstStyle/>
+                    <a:p>
+                      <a:pPr>
+                        <a:lnSpc>
+                          <a:spcPct val="107000"/>
+                        </a:lnSpc>
+                        <a:spcAft>
+                          <a:spcPts val="800"/>
+                        </a:spcAft>
+                      </a:pPr>
+                      <a:r>
+                        <a:rPr lang="en-IE" sz="800" b="1" dirty="0">
+                          <a:effectLst/>
+                        </a:rPr>
+                        <a:t>Summary:</a:t>
+                      </a:r>
+                      <a:endParaRPr lang="en-IE" sz="800" b="1" dirty="0">
+                        <a:effectLst/>
+                        <a:latin typeface="Calibri" panose="020F0502020204030204" pitchFamily="34" charset="0"/>
+                        <a:ea typeface="Calibri" panose="020F0502020204030204" pitchFamily="34" charset="0"/>
+                        <a:cs typeface="Times New Roman" panose="02020603050405020304" pitchFamily="18" charset="0"/>
+                      </a:endParaRPr>
+                    </a:p>
+                  </a:txBody>
+                  <a:tcPr marL="61066" marR="61066" marT="0" marB="0"/>
+                </a:tc>
+                <a:tc>
+                  <a:txBody>
+                    <a:bodyPr/>
+                    <a:lstStyle/>
+                    <a:p>
+                      <a:pPr>
+                        <a:lnSpc>
+                          <a:spcPct val="107000"/>
+                        </a:lnSpc>
+                        <a:spcAft>
+                          <a:spcPts val="800"/>
+                        </a:spcAft>
+                      </a:pPr>
+                      <a:r>
+                        <a:rPr lang="en-IE" sz="800" b="1" dirty="0">
+                          <a:effectLst/>
+                        </a:rPr>
+                        <a:t>Description:</a:t>
+                      </a:r>
+                      <a:endParaRPr lang="en-IE" sz="800" b="1" dirty="0">
+                        <a:effectLst/>
+                        <a:latin typeface="Calibri" panose="020F0502020204030204" pitchFamily="34" charset="0"/>
+                        <a:ea typeface="Calibri" panose="020F0502020204030204" pitchFamily="34" charset="0"/>
+                        <a:cs typeface="Times New Roman" panose="02020603050405020304" pitchFamily="18" charset="0"/>
+                      </a:endParaRPr>
+                    </a:p>
+                  </a:txBody>
+                  <a:tcPr marL="61066" marR="61066" marT="0" marB="0"/>
+                </a:tc>
+                <a:tc>
+                  <a:txBody>
+                    <a:bodyPr/>
+                    <a:lstStyle/>
+                    <a:p>
+                      <a:pPr>
+                        <a:lnSpc>
+                          <a:spcPct val="107000"/>
+                        </a:lnSpc>
+                        <a:spcAft>
+                          <a:spcPts val="800"/>
+                        </a:spcAft>
+                      </a:pPr>
+                      <a:r>
+                        <a:rPr lang="en-IE" sz="800" b="1" dirty="0">
+                          <a:effectLst/>
+                        </a:rPr>
+                        <a:t>Actual Results:</a:t>
+                      </a:r>
+                      <a:endParaRPr lang="en-IE" sz="800" b="1" dirty="0">
+                        <a:effectLst/>
+                        <a:latin typeface="Calibri" panose="020F0502020204030204" pitchFamily="34" charset="0"/>
+                        <a:ea typeface="Calibri" panose="020F0502020204030204" pitchFamily="34" charset="0"/>
+                        <a:cs typeface="Times New Roman" panose="02020603050405020304" pitchFamily="18" charset="0"/>
+                      </a:endParaRPr>
+                    </a:p>
+                  </a:txBody>
+                  <a:tcPr marL="61066" marR="61066" marT="0" marB="0"/>
+                </a:tc>
+                <a:tc>
+                  <a:txBody>
+                    <a:bodyPr/>
+                    <a:lstStyle/>
+                    <a:p>
+                      <a:pPr>
+                        <a:lnSpc>
+                          <a:spcPct val="107000"/>
+                        </a:lnSpc>
+                        <a:spcAft>
+                          <a:spcPts val="800"/>
+                        </a:spcAft>
+                      </a:pPr>
+                      <a:r>
+                        <a:rPr lang="en-IE" sz="800" b="1" dirty="0">
+                          <a:effectLst/>
+                        </a:rPr>
+                        <a:t>Expected Results:</a:t>
+                      </a:r>
+                      <a:endParaRPr lang="en-IE" sz="800" b="1" dirty="0">
+                        <a:effectLst/>
+                        <a:latin typeface="Calibri" panose="020F0502020204030204" pitchFamily="34" charset="0"/>
+                        <a:ea typeface="Calibri" panose="020F0502020204030204" pitchFamily="34" charset="0"/>
+                        <a:cs typeface="Times New Roman" panose="02020603050405020304" pitchFamily="18" charset="0"/>
+                      </a:endParaRPr>
+                    </a:p>
+                  </a:txBody>
+                  <a:tcPr marL="61066" marR="61066" marT="0" marB="0"/>
+                </a:tc>
+                <a:tc>
+                  <a:txBody>
+                    <a:bodyPr/>
+                    <a:lstStyle/>
+                    <a:p>
+                      <a:pPr>
+                        <a:lnSpc>
+                          <a:spcPct val="107000"/>
+                        </a:lnSpc>
+                        <a:spcAft>
+                          <a:spcPts val="800"/>
+                        </a:spcAft>
+                      </a:pPr>
+                      <a:r>
+                        <a:rPr lang="en-IE" sz="800" b="1" dirty="0">
+                          <a:effectLst/>
+                        </a:rPr>
+                        <a:t>Other Information:</a:t>
+                      </a:r>
+                      <a:endParaRPr lang="en-IE" sz="800" b="1" dirty="0">
+                        <a:effectLst/>
+                        <a:latin typeface="Calibri" panose="020F0502020204030204" pitchFamily="34" charset="0"/>
+                        <a:ea typeface="Calibri" panose="020F0502020204030204" pitchFamily="34" charset="0"/>
+                        <a:cs typeface="Times New Roman" panose="02020603050405020304" pitchFamily="18" charset="0"/>
+                      </a:endParaRPr>
+                    </a:p>
+                  </a:txBody>
+                  <a:tcPr marL="61066" marR="61066" marT="0" marB="0"/>
+                </a:tc>
+                <a:tc>
+                  <a:txBody>
+                    <a:bodyPr/>
+                    <a:lstStyle/>
+                    <a:p>
+                      <a:pPr>
+                        <a:lnSpc>
+                          <a:spcPct val="107000"/>
+                        </a:lnSpc>
+                        <a:spcAft>
+                          <a:spcPts val="800"/>
+                        </a:spcAft>
+                      </a:pPr>
+                      <a:r>
+                        <a:rPr lang="en-IE" sz="800" b="1" dirty="0">
+                          <a:effectLst/>
+                        </a:rPr>
+                        <a:t>Attachment:</a:t>
+                      </a:r>
+                      <a:endParaRPr lang="en-IE" sz="800" b="1" dirty="0">
+                        <a:effectLst/>
+                        <a:latin typeface="Calibri" panose="020F0502020204030204" pitchFamily="34" charset="0"/>
+                        <a:ea typeface="Calibri" panose="020F0502020204030204" pitchFamily="34" charset="0"/>
+                        <a:cs typeface="Times New Roman" panose="02020603050405020304" pitchFamily="18" charset="0"/>
+                      </a:endParaRPr>
+                    </a:p>
+                  </a:txBody>
+                  <a:tcPr marL="61066" marR="61066" marT="0" marB="0"/>
+                </a:tc>
+              </a:tr>
+              <a:tr h="1549042">
+                <a:tc>
+                  <a:txBody>
+                    <a:bodyPr/>
+                    <a:lstStyle/>
+                    <a:p>
+                      <a:pPr>
+                        <a:lnSpc>
+                          <a:spcPct val="107000"/>
+                        </a:lnSpc>
+                        <a:spcAft>
+                          <a:spcPts val="0"/>
+                        </a:spcAft>
+                      </a:pPr>
+                      <a:r>
+                        <a:rPr lang="en-IE" sz="800" dirty="0" smtClean="0">
+                          <a:effectLst/>
+                        </a:rPr>
+                        <a:t>Settings</a:t>
+                      </a:r>
+                      <a:endParaRPr lang="en-IE" sz="800" dirty="0">
+                        <a:effectLst/>
+                        <a:latin typeface="Calibri" panose="020F0502020204030204" pitchFamily="34" charset="0"/>
+                        <a:ea typeface="Calibri" panose="020F0502020204030204" pitchFamily="34" charset="0"/>
+                        <a:cs typeface="Times New Roman" panose="02020603050405020304" pitchFamily="18" charset="0"/>
+                      </a:endParaRPr>
+                    </a:p>
+                  </a:txBody>
+                  <a:tcPr marL="61066" marR="61066" marT="0" marB="0"/>
+                </a:tc>
+                <a:tc>
+                  <a:txBody>
+                    <a:bodyPr/>
+                    <a:lstStyle/>
+                    <a:p>
+                      <a:pPr>
+                        <a:lnSpc>
+                          <a:spcPct val="107000"/>
+                        </a:lnSpc>
+                        <a:spcAft>
+                          <a:spcPts val="0"/>
+                        </a:spcAft>
+                      </a:pPr>
+                      <a:r>
+                        <a:rPr lang="en-IE" sz="800" dirty="0" smtClean="0">
+                          <a:effectLst/>
+                        </a:rPr>
+                        <a:t>Promotions</a:t>
+                      </a:r>
+                      <a:endParaRPr lang="en-IE" sz="800" dirty="0">
+                        <a:effectLst/>
+                        <a:latin typeface="Calibri" panose="020F0502020204030204" pitchFamily="34" charset="0"/>
+                        <a:ea typeface="Calibri" panose="020F0502020204030204" pitchFamily="34" charset="0"/>
+                        <a:cs typeface="Times New Roman" panose="02020603050405020304" pitchFamily="18" charset="0"/>
+                      </a:endParaRPr>
+                    </a:p>
+                  </a:txBody>
+                  <a:tcPr marL="61066" marR="61066" marT="0" marB="0"/>
+                </a:tc>
+                <a:tc>
+                  <a:txBody>
+                    <a:bodyPr/>
+                    <a:lstStyle/>
+                    <a:p>
+                      <a:pPr>
+                        <a:lnSpc>
+                          <a:spcPct val="107000"/>
+                        </a:lnSpc>
+                        <a:spcAft>
+                          <a:spcPts val="800"/>
+                        </a:spcAft>
+                      </a:pPr>
+                      <a:r>
+                        <a:rPr lang="en-IE" sz="800" i="1" dirty="0">
+                          <a:solidFill>
+                            <a:schemeClr val="tx2">
+                              <a:lumMod val="60000"/>
+                              <a:lumOff val="40000"/>
+                            </a:schemeClr>
+                          </a:solidFill>
+                          <a:effectLst/>
+                        </a:rPr>
+                        <a:t>Give full details of the issue, giving as much detail as possible.</a:t>
+                      </a:r>
+                    </a:p>
+                    <a:p>
+                      <a:pPr>
+                        <a:lnSpc>
+                          <a:spcPct val="107000"/>
+                        </a:lnSpc>
+                        <a:spcAft>
+                          <a:spcPts val="0"/>
+                        </a:spcAft>
+                      </a:pPr>
+                      <a:r>
+                        <a:rPr lang="en-IE" sz="800" dirty="0" smtClean="0">
+                          <a:effectLst/>
+                          <a:latin typeface="+mn-lt"/>
+                          <a:ea typeface="+mn-ea"/>
+                          <a:cs typeface="+mn-cs"/>
+                        </a:rPr>
+                        <a:t>Make</a:t>
+                      </a:r>
+                      <a:r>
+                        <a:rPr lang="en-IE" sz="800" baseline="0" dirty="0" smtClean="0">
+                          <a:effectLst/>
+                          <a:latin typeface="+mn-lt"/>
+                          <a:ea typeface="+mn-ea"/>
+                          <a:cs typeface="+mn-cs"/>
+                        </a:rPr>
+                        <a:t> the promotions and save</a:t>
+                      </a:r>
+                      <a:endParaRPr lang="en-IE" sz="800" dirty="0">
+                        <a:effectLst/>
+                        <a:latin typeface="Calibri" panose="020F0502020204030204" pitchFamily="34" charset="0"/>
+                        <a:ea typeface="Calibri" panose="020F0502020204030204" pitchFamily="34" charset="0"/>
+                        <a:cs typeface="Times New Roman" panose="02020603050405020304" pitchFamily="18" charset="0"/>
+                      </a:endParaRPr>
+                    </a:p>
+                  </a:txBody>
+                  <a:tcPr marL="61066" marR="61066" marT="0" marB="0"/>
+                </a:tc>
+                <a:tc>
+                  <a:txBody>
+                    <a:bodyPr/>
+                    <a:lstStyle/>
+                    <a:p>
+                      <a:pPr>
+                        <a:lnSpc>
+                          <a:spcPct val="107000"/>
+                        </a:lnSpc>
+                        <a:spcAft>
+                          <a:spcPts val="800"/>
+                        </a:spcAft>
+                      </a:pPr>
+                      <a:r>
+                        <a:rPr lang="en-IE" sz="800" i="1" dirty="0">
+                          <a:solidFill>
+                            <a:schemeClr val="tx2">
+                              <a:lumMod val="60000"/>
+                              <a:lumOff val="40000"/>
+                            </a:schemeClr>
+                          </a:solidFill>
+                          <a:effectLst/>
+                        </a:rPr>
+                        <a:t>what did the application do after performing the above steps </a:t>
+                      </a:r>
+                    </a:p>
+                    <a:p>
+                      <a:pPr>
+                        <a:lnSpc>
+                          <a:spcPct val="107000"/>
+                        </a:lnSpc>
+                        <a:spcAft>
+                          <a:spcPts val="0"/>
+                        </a:spcAft>
+                      </a:pPr>
+                      <a:r>
+                        <a:rPr lang="en-IE" sz="800" dirty="0" smtClean="0">
+                          <a:effectLst/>
+                          <a:latin typeface="+mn-lt"/>
+                          <a:ea typeface="+mn-ea"/>
+                          <a:cs typeface="+mn-cs"/>
+                        </a:rPr>
+                        <a:t>It</a:t>
+                      </a:r>
+                      <a:r>
+                        <a:rPr lang="en-IE" sz="800" baseline="0" dirty="0" smtClean="0">
+                          <a:effectLst/>
+                          <a:latin typeface="+mn-lt"/>
+                          <a:ea typeface="+mn-ea"/>
+                          <a:cs typeface="+mn-cs"/>
+                        </a:rPr>
+                        <a:t> is not possible to save the promotion</a:t>
+                      </a:r>
+                      <a:endParaRPr lang="en-IE" sz="800" dirty="0">
+                        <a:effectLst/>
+                        <a:latin typeface="Calibri" panose="020F0502020204030204" pitchFamily="34" charset="0"/>
+                        <a:ea typeface="Calibri" panose="020F0502020204030204" pitchFamily="34" charset="0"/>
+                        <a:cs typeface="Times New Roman" panose="02020603050405020304" pitchFamily="18" charset="0"/>
+                      </a:endParaRPr>
+                    </a:p>
+                  </a:txBody>
+                  <a:tcPr marL="61066" marR="61066" marT="0" marB="0"/>
+                </a:tc>
+                <a:tc>
+                  <a:txBody>
+                    <a:bodyPr/>
+                    <a:lstStyle/>
+                    <a:p>
+                      <a:pPr>
+                        <a:lnSpc>
+                          <a:spcPct val="107000"/>
+                        </a:lnSpc>
+                        <a:spcAft>
+                          <a:spcPts val="800"/>
+                        </a:spcAft>
+                      </a:pPr>
+                      <a:r>
+                        <a:rPr lang="en-IE" sz="800" i="1" dirty="0">
+                          <a:solidFill>
+                            <a:schemeClr val="tx2">
+                              <a:lumMod val="60000"/>
+                              <a:lumOff val="40000"/>
+                            </a:schemeClr>
+                          </a:solidFill>
+                          <a:effectLst/>
+                        </a:rPr>
+                        <a:t>What the application should have done, if there was no bug. </a:t>
+                      </a:r>
+                    </a:p>
+                    <a:p>
+                      <a:pPr>
+                        <a:lnSpc>
+                          <a:spcPct val="107000"/>
+                        </a:lnSpc>
+                        <a:spcAft>
+                          <a:spcPts val="800"/>
+                        </a:spcAft>
+                      </a:pPr>
+                      <a:r>
+                        <a:rPr lang="en-IE" sz="800" dirty="0" smtClean="0">
+                          <a:effectLst/>
+                          <a:latin typeface="+mn-lt"/>
+                          <a:ea typeface="+mn-ea"/>
+                          <a:cs typeface="+mn-cs"/>
+                        </a:rPr>
+                        <a:t>The</a:t>
+                      </a:r>
+                      <a:r>
+                        <a:rPr lang="en-IE" sz="800" baseline="0" dirty="0" smtClean="0">
+                          <a:effectLst/>
+                          <a:latin typeface="+mn-lt"/>
+                          <a:ea typeface="+mn-ea"/>
+                          <a:cs typeface="+mn-cs"/>
+                        </a:rPr>
+                        <a:t> user should save the promotion.</a:t>
+                      </a:r>
+                      <a:endParaRPr lang="en-IE" sz="800" dirty="0">
+                        <a:effectLst/>
+                        <a:latin typeface="Calibri" panose="020F0502020204030204" pitchFamily="34" charset="0"/>
+                        <a:ea typeface="Calibri" panose="020F0502020204030204" pitchFamily="34" charset="0"/>
+                        <a:cs typeface="Times New Roman" panose="02020603050405020304" pitchFamily="18" charset="0"/>
+                      </a:endParaRPr>
+                    </a:p>
+                  </a:txBody>
+                  <a:tcPr marL="61066" marR="61066" marT="0" marB="0"/>
+                </a:tc>
+                <a:tc>
+                  <a:txBody>
+                    <a:bodyPr/>
+                    <a:lstStyle/>
+                    <a:p>
+                      <a:pPr>
+                        <a:lnSpc>
+                          <a:spcPct val="107000"/>
+                        </a:lnSpc>
+                        <a:spcAft>
+                          <a:spcPts val="0"/>
+                        </a:spcAft>
+                      </a:pPr>
+                      <a:r>
+                        <a:rPr lang="en-IE" sz="800" dirty="0">
+                          <a:effectLst/>
+                        </a:rPr>
+                        <a:t> </a:t>
+                      </a:r>
+                      <a:endParaRPr lang="en-IE" sz="800" dirty="0">
+                        <a:effectLst/>
+                        <a:latin typeface="Calibri" panose="020F0502020204030204" pitchFamily="34" charset="0"/>
+                        <a:ea typeface="Calibri" panose="020F0502020204030204" pitchFamily="34" charset="0"/>
+                        <a:cs typeface="Times New Roman" panose="02020603050405020304" pitchFamily="18" charset="0"/>
+                      </a:endParaRPr>
+                    </a:p>
+                  </a:txBody>
+                  <a:tcPr marL="61066" marR="61066" marT="0" marB="0"/>
+                </a:tc>
+                <a:tc>
+                  <a:txBody>
+                    <a:bodyPr/>
+                    <a:lstStyle/>
+                    <a:p>
+                      <a:pPr>
+                        <a:lnSpc>
+                          <a:spcPct val="107000"/>
+                        </a:lnSpc>
+                        <a:spcAft>
+                          <a:spcPts val="0"/>
+                        </a:spcAft>
+                      </a:pPr>
+                      <a:endParaRPr lang="en-IE" sz="800" i="1" dirty="0">
+                        <a:solidFill>
+                          <a:schemeClr val="tx2">
+                            <a:lumMod val="60000"/>
+                            <a:lumOff val="40000"/>
+                          </a:schemeClr>
+                        </a:solidFill>
+                        <a:effectLst/>
+                        <a:latin typeface="Calibri" panose="020F0502020204030204" pitchFamily="34" charset="0"/>
+                        <a:ea typeface="Calibri" panose="020F0502020204030204" pitchFamily="34" charset="0"/>
+                        <a:cs typeface="Times New Roman" panose="02020603050405020304" pitchFamily="18" charset="0"/>
+                      </a:endParaRPr>
+                    </a:p>
+                  </a:txBody>
+                  <a:tcPr marL="61066" marR="61066" marT="0" marB="0"/>
+                </a:tc>
+              </a:tr>
+            </a:tbl>
+          </a:graphicData>
+        </a:graphic>
+      </p:graphicFrame>
+      <p:pic>
+        <p:nvPicPr>
+          <p:cNvPr id="11" name="Picture 10"/>
+          <p:cNvPicPr>
+            <a:picLocks noChangeAspect="1"/>
+          </p:cNvPicPr>
+          <p:nvPr/>
+        </p:nvPicPr>
+        <p:blipFill>
+          <a:blip r:embed="rId2" cstate="print">
+            <a:extLst>
+              <a:ext uri="{28A0092B-C50C-407E-A947-70E740481C1C}">
+                <a14:useLocalDpi xmlns:a14="http://schemas.microsoft.com/office/drawing/2010/main" val="0"/>
+              </a:ext>
+            </a:extLst>
+          </a:blip>
+          <a:stretch>
+            <a:fillRect/>
+          </a:stretch>
+        </p:blipFill>
+        <p:spPr>
+          <a:xfrm>
+            <a:off x="5654201" y="1316736"/>
+            <a:ext cx="800693" cy="1423308"/>
+          </a:xfrm>
+          <a:prstGeom prst="rect">
+            <a:avLst/>
+          </a:prstGeom>
+          <a:solidFill>
+            <a:schemeClr val="accent1">
+              <a:lumMod val="20000"/>
+              <a:lumOff val="80000"/>
+              <a:alpha val="50000"/>
+            </a:schemeClr>
+          </a:solidFill>
+        </p:spPr>
+      </p:pic>
+      <p:pic>
+        <p:nvPicPr>
+          <p:cNvPr id="12" name="Picture 11"/>
+          <p:cNvPicPr>
+            <a:picLocks noChangeAspect="1"/>
+          </p:cNvPicPr>
+          <p:nvPr/>
+        </p:nvPicPr>
+        <p:blipFill>
+          <a:blip r:embed="rId2" cstate="print">
+            <a:extLst>
+              <a:ext uri="{28A0092B-C50C-407E-A947-70E740481C1C}">
+                <a14:useLocalDpi xmlns:a14="http://schemas.microsoft.com/office/drawing/2010/main" val="0"/>
+              </a:ext>
+            </a:extLst>
+          </a:blip>
+          <a:stretch>
+            <a:fillRect/>
+          </a:stretch>
+        </p:blipFill>
+        <p:spPr>
+          <a:xfrm>
+            <a:off x="5705410" y="3474719"/>
+            <a:ext cx="800693" cy="1423308"/>
+          </a:xfrm>
+          <a:prstGeom prst="rect">
+            <a:avLst/>
+          </a:prstGeom>
+          <a:solidFill>
+            <a:schemeClr val="accent1">
+              <a:lumMod val="20000"/>
+              <a:lumOff val="80000"/>
+              <a:alpha val="50000"/>
+            </a:schemeClr>
+          </a:solidFill>
+        </p:spPr>
+      </p:pic>
+      <p:pic>
+        <p:nvPicPr>
+          <p:cNvPr id="14" name="Picture 13"/>
+          <p:cNvPicPr>
+            <a:picLocks noChangeAspect="1"/>
+          </p:cNvPicPr>
+          <p:nvPr/>
+        </p:nvPicPr>
+        <p:blipFill>
+          <a:blip r:embed="rId2" cstate="print">
+            <a:extLst>
+              <a:ext uri="{28A0092B-C50C-407E-A947-70E740481C1C}">
+                <a14:useLocalDpi xmlns:a14="http://schemas.microsoft.com/office/drawing/2010/main" val="0"/>
+              </a:ext>
+            </a:extLst>
+          </a:blip>
+          <a:stretch>
+            <a:fillRect/>
+          </a:stretch>
+        </p:blipFill>
+        <p:spPr>
+          <a:xfrm>
+            <a:off x="5705409" y="5493714"/>
+            <a:ext cx="800693" cy="1423308"/>
+          </a:xfrm>
+          <a:prstGeom prst="rect">
+            <a:avLst/>
+          </a:prstGeom>
+          <a:solidFill>
+            <a:schemeClr val="accent1">
+              <a:lumMod val="20000"/>
+              <a:lumOff val="80000"/>
+              <a:alpha val="50000"/>
+            </a:schemeClr>
+          </a:solidFill>
+        </p:spPr>
+      </p:pic>
+      <p:pic>
+        <p:nvPicPr>
+          <p:cNvPr id="15" name="Picture 14"/>
+          <p:cNvPicPr>
+            <a:picLocks noChangeAspect="1"/>
+          </p:cNvPicPr>
+          <p:nvPr/>
+        </p:nvPicPr>
+        <p:blipFill>
+          <a:blip r:embed="rId2" cstate="print">
+            <a:extLst>
+              <a:ext uri="{28A0092B-C50C-407E-A947-70E740481C1C}">
+                <a14:useLocalDpi xmlns:a14="http://schemas.microsoft.com/office/drawing/2010/main" val="0"/>
+              </a:ext>
+            </a:extLst>
+          </a:blip>
+          <a:stretch>
+            <a:fillRect/>
+          </a:stretch>
+        </p:blipFill>
+        <p:spPr>
+          <a:xfrm>
+            <a:off x="5705408" y="7805317"/>
+            <a:ext cx="800693" cy="1423308"/>
+          </a:xfrm>
+          <a:prstGeom prst="rect">
+            <a:avLst/>
+          </a:prstGeom>
+          <a:solidFill>
+            <a:schemeClr val="accent1">
+              <a:lumMod val="20000"/>
+              <a:lumOff val="80000"/>
+              <a:alpha val="50000"/>
+            </a:schemeClr>
+          </a:solidFill>
+        </p:spPr>
+      </p:pic>
+    </p:spTree>
+    <p:extLst>
+      <p:ext uri="{BB962C8B-B14F-4D97-AF65-F5344CB8AC3E}">
+        <p14:creationId xmlns:p14="http://schemas.microsoft.com/office/powerpoint/2010/main" val="3122225710"/>
+      </p:ext>
+    </p:extLst>
+  </p:cSld>
+  <p:clrMapOvr>
+    <a:masterClrMapping/>
+  </p:clrMapOvr>
+  <p:timing>
+    <p:tnLst>
+      <p:par>
+        <p:cTn id="1" dur="indefinite" restart="never" nodeType="tmRoot"/>
+      </p:par>
+    </p:tnLst>
+  </p:timing>
+</p:sld>
+</file>
+
+<file path=ppt/slides/slide6.xml><?xml version="1.0" encoding="utf-8"?>
+<p:sld xmlns:a="http://schemas.openxmlformats.org/drawingml/2006/main" xmlns:r="http://schemas.openxmlformats.org/officeDocument/2006/relationships" xmlns:p="http://schemas.openxmlformats.org/presentationml/2006/main">
+  <p:cSld>
+    <p:spTree>
+      <p:nvGrpSpPr>
+        <p:cNvPr id="1" name=""/>
+        <p:cNvGrpSpPr/>
+        <p:nvPr/>
+      </p:nvGrpSpPr>
+      <p:grpSpPr>
+        <a:xfrm>
+          <a:off x="0" y="0"/>
+          <a:ext cx="0" cy="0"/>
+          <a:chOff x="0" y="0"/>
+          <a:chExt cx="0" cy="0"/>
+        </a:xfrm>
+      </p:grpSpPr>
+      <p:sp>
+        <p:nvSpPr>
+          <p:cNvPr id="2" name="Footer Placeholder 1"/>
+          <p:cNvSpPr>
+            <a:spLocks noGrp="1"/>
+          </p:cNvSpPr>
+          <p:nvPr>
+            <p:ph type="ftr" sz="quarter" idx="11"/>
+          </p:nvPr>
+        </p:nvSpPr>
+        <p:spPr/>
+        <p:txBody>
+          <a:bodyPr/>
+          <a:lstStyle/>
+          <a:p>
+            <a:r>
+              <a:rPr lang="ga-IE" smtClean="0">
+                <a:solidFill>
+                  <a:prstClr val="black">
+                    <a:tint val="75000"/>
+                  </a:prstClr>
+                </a:solidFill>
+              </a:rPr>
+              <a:t>IrishApps</a:t>
+            </a:r>
+            <a:endParaRPr lang="ga-IE">
+              <a:solidFill>
+                <a:prstClr val="black">
+                  <a:tint val="75000"/>
+                </a:prstClr>
+              </a:solidFill>
+            </a:endParaRPr>
+          </a:p>
+        </p:txBody>
+      </p:sp>
+      <p:sp>
+        <p:nvSpPr>
+          <p:cNvPr id="3" name="Slide Number Placeholder 2"/>
+          <p:cNvSpPr>
+            <a:spLocks noGrp="1"/>
+          </p:cNvSpPr>
+          <p:nvPr>
+            <p:ph type="sldNum" sz="quarter" idx="12"/>
+          </p:nvPr>
+        </p:nvSpPr>
+        <p:spPr/>
+        <p:txBody>
+          <a:bodyPr/>
+          <a:lstStyle/>
+          <a:p>
+            <a:fld id="{9F181B0E-BCC9-4F7B-9A07-FD9E8F929D4E}" type="slidenum">
               <a:rPr lang="ga-IE" smtClean="0">
                 <a:solidFill>
                   <a:prstClr val="black">
@@ -7507,7 +10018,7 @@
                 </a:solidFill>
               </a:rPr>
               <a:pPr/>
-              <a:t>5</a:t>
+              <a:t>6</a:t>
             </a:fld>
             <a:endParaRPr lang="ga-IE">
               <a:solidFill>

</xml_diff>